<commit_message>
Finished layout of presentation.
</commit_message>
<xml_diff>
--- a/Session 7 - Python/Instructional Material/Session 7 - Python Plotting with MatPlotLib.pptx
+++ b/Session 7 - Python/Instructional Material/Session 7 - Python Plotting with MatPlotLib.pptx
@@ -8,7 +8,13 @@
   <p:sldIdLst>
     <p:sldId id="256" r:id="rId3"/>
     <p:sldId id="282" r:id="rId4"/>
-    <p:sldId id="375" r:id="rId5"/>
+    <p:sldId id="376" r:id="rId5"/>
+    <p:sldId id="377" r:id="rId6"/>
+    <p:sldId id="378" r:id="rId7"/>
+    <p:sldId id="380" r:id="rId8"/>
+    <p:sldId id="381" r:id="rId9"/>
+    <p:sldId id="379" r:id="rId10"/>
+    <p:sldId id="375" r:id="rId11"/>
   </p:sldIdLst>
   <p:sldSz cx="9144000" cy="6858000" type="screen4x3"/>
   <p:notesSz cx="6858000" cy="9144000"/>
@@ -305,7 +311,7 @@
           <a:p>
             <a:fld id="{547641E8-73DF-4AD2-848E-3103064331B1}" type="datetimeFigureOut">
               <a:rPr lang="en-US" smtClean="0"/>
-              <a:t>2/13/2020</a:t>
+              <a:t>10/11/2021</a:t>
             </a:fld>
             <a:endParaRPr lang="en-US"/>
           </a:p>
@@ -473,7 +479,7 @@
           <a:p>
             <a:fld id="{547641E8-73DF-4AD2-848E-3103064331B1}" type="datetimeFigureOut">
               <a:rPr lang="en-US" smtClean="0"/>
-              <a:t>2/13/2020</a:t>
+              <a:t>10/11/2021</a:t>
             </a:fld>
             <a:endParaRPr lang="en-US"/>
           </a:p>
@@ -651,7 +657,7 @@
           <a:p>
             <a:fld id="{547641E8-73DF-4AD2-848E-3103064331B1}" type="datetimeFigureOut">
               <a:rPr lang="en-US" smtClean="0"/>
-              <a:t>2/13/2020</a:t>
+              <a:t>10/11/2021</a:t>
             </a:fld>
             <a:endParaRPr lang="en-US"/>
           </a:p>
@@ -898,7 +904,7 @@
                 </a:solidFill>
               </a:rPr>
               <a:pPr/>
-              <a:t>2/13/2020</a:t>
+              <a:t>10/11/2021</a:t>
             </a:fld>
             <a:endParaRPr lang="en-US">
               <a:solidFill>
@@ -1098,7 +1104,7 @@
                 </a:solidFill>
               </a:rPr>
               <a:pPr/>
-              <a:t>2/13/2020</a:t>
+              <a:t>10/11/2021</a:t>
             </a:fld>
             <a:endParaRPr lang="en-US">
               <a:solidFill>
@@ -1375,7 +1381,7 @@
                 </a:solidFill>
               </a:rPr>
               <a:pPr/>
-              <a:t>2/13/2020</a:t>
+              <a:t>10/11/2021</a:t>
             </a:fld>
             <a:endParaRPr lang="en-US">
               <a:solidFill>
@@ -1692,7 +1698,7 @@
                 </a:solidFill>
               </a:rPr>
               <a:pPr/>
-              <a:t>2/13/2020</a:t>
+              <a:t>10/11/2021</a:t>
             </a:fld>
             <a:endParaRPr lang="en-US">
               <a:solidFill>
@@ -2143,7 +2149,7 @@
                 </a:solidFill>
               </a:rPr>
               <a:pPr/>
-              <a:t>2/13/2020</a:t>
+              <a:t>10/11/2021</a:t>
             </a:fld>
             <a:endParaRPr lang="en-US">
               <a:solidFill>
@@ -2292,7 +2298,7 @@
                 </a:solidFill>
               </a:rPr>
               <a:pPr/>
-              <a:t>2/13/2020</a:t>
+              <a:t>10/11/2021</a:t>
             </a:fld>
             <a:endParaRPr lang="en-US">
               <a:solidFill>
@@ -2419,7 +2425,7 @@
                 </a:solidFill>
               </a:rPr>
               <a:pPr/>
-              <a:t>2/13/2020</a:t>
+              <a:t>10/11/2021</a:t>
             </a:fld>
             <a:endParaRPr lang="en-US">
               <a:solidFill>
@@ -2726,7 +2732,7 @@
                 </a:solidFill>
               </a:rPr>
               <a:pPr/>
-              <a:t>2/13/2020</a:t>
+              <a:t>10/11/2021</a:t>
             </a:fld>
             <a:endParaRPr lang="en-US">
               <a:solidFill>
@@ -2919,7 +2925,7 @@
           <a:p>
             <a:fld id="{547641E8-73DF-4AD2-848E-3103064331B1}" type="datetimeFigureOut">
               <a:rPr lang="en-US" smtClean="0"/>
-              <a:t>2/13/2020</a:t>
+              <a:t>10/11/2021</a:t>
             </a:fld>
             <a:endParaRPr lang="en-US"/>
           </a:p>
@@ -3178,7 +3184,7 @@
                 </a:solidFill>
               </a:rPr>
               <a:pPr/>
-              <a:t>2/13/2020</a:t>
+              <a:t>10/11/2021</a:t>
             </a:fld>
             <a:endParaRPr lang="en-US">
               <a:solidFill>
@@ -3378,7 +3384,7 @@
                 </a:solidFill>
               </a:rPr>
               <a:pPr/>
-              <a:t>2/13/2020</a:t>
+              <a:t>10/11/2021</a:t>
             </a:fld>
             <a:endParaRPr lang="en-US">
               <a:solidFill>
@@ -3588,7 +3594,7 @@
                 </a:solidFill>
               </a:rPr>
               <a:pPr/>
-              <a:t>2/13/2020</a:t>
+              <a:t>10/11/2021</a:t>
             </a:fld>
             <a:endParaRPr lang="en-US">
               <a:solidFill>
@@ -3858,7 +3864,7 @@
           <a:p>
             <a:fld id="{547641E8-73DF-4AD2-848E-3103064331B1}" type="datetimeFigureOut">
               <a:rPr lang="en-US" smtClean="0"/>
-              <a:t>2/13/2020</a:t>
+              <a:t>10/11/2021</a:t>
             </a:fld>
             <a:endParaRPr lang="en-US"/>
           </a:p>
@@ -4143,7 +4149,7 @@
           <a:p>
             <a:fld id="{547641E8-73DF-4AD2-848E-3103064331B1}" type="datetimeFigureOut">
               <a:rPr lang="en-US" smtClean="0"/>
-              <a:t>2/13/2020</a:t>
+              <a:t>10/11/2021</a:t>
             </a:fld>
             <a:endParaRPr lang="en-US"/>
           </a:p>
@@ -4562,7 +4568,7 @@
           <a:p>
             <a:fld id="{547641E8-73DF-4AD2-848E-3103064331B1}" type="datetimeFigureOut">
               <a:rPr lang="en-US" smtClean="0"/>
-              <a:t>2/13/2020</a:t>
+              <a:t>10/11/2021</a:t>
             </a:fld>
             <a:endParaRPr lang="en-US"/>
           </a:p>
@@ -4679,7 +4685,7 @@
           <a:p>
             <a:fld id="{547641E8-73DF-4AD2-848E-3103064331B1}" type="datetimeFigureOut">
               <a:rPr lang="en-US" smtClean="0"/>
-              <a:t>2/13/2020</a:t>
+              <a:t>10/11/2021</a:t>
             </a:fld>
             <a:endParaRPr lang="en-US"/>
           </a:p>
@@ -4774,7 +4780,7 @@
           <a:p>
             <a:fld id="{547641E8-73DF-4AD2-848E-3103064331B1}" type="datetimeFigureOut">
               <a:rPr lang="en-US" smtClean="0"/>
-              <a:t>2/13/2020</a:t>
+              <a:t>10/11/2021</a:t>
             </a:fld>
             <a:endParaRPr lang="en-US"/>
           </a:p>
@@ -5049,7 +5055,7 @@
           <a:p>
             <a:fld id="{547641E8-73DF-4AD2-848E-3103064331B1}" type="datetimeFigureOut">
               <a:rPr lang="en-US" smtClean="0"/>
-              <a:t>2/13/2020</a:t>
+              <a:t>10/11/2021</a:t>
             </a:fld>
             <a:endParaRPr lang="en-US"/>
           </a:p>
@@ -5301,7 +5307,7 @@
           <a:p>
             <a:fld id="{547641E8-73DF-4AD2-848E-3103064331B1}" type="datetimeFigureOut">
               <a:rPr lang="en-US" smtClean="0"/>
-              <a:t>2/13/2020</a:t>
+              <a:t>10/11/2021</a:t>
             </a:fld>
             <a:endParaRPr lang="en-US"/>
           </a:p>
@@ -5515,7 +5521,7 @@
           <a:p>
             <a:fld id="{547641E8-73DF-4AD2-848E-3103064331B1}" type="datetimeFigureOut">
               <a:rPr lang="en-US" smtClean="0"/>
-              <a:t>2/13/2020</a:t>
+              <a:t>10/11/2021</a:t>
             </a:fld>
             <a:endParaRPr lang="en-US"/>
           </a:p>
@@ -6030,7 +6036,7 @@
                 </a:solidFill>
               </a:rPr>
               <a:pPr/>
-              <a:t>2/13/2020</a:t>
+              <a:t>10/11/2021</a:t>
             </a:fld>
             <a:endParaRPr lang="en-US">
               <a:solidFill>
@@ -6581,6 +6587,30 @@
             </a:r>
           </a:p>
           <a:p>
+            <a:r>
+              <a:rPr lang="en-US" dirty="0"/>
+              <a:t>Basic Plotting</a:t>
+            </a:r>
+          </a:p>
+          <a:p>
+            <a:r>
+              <a:rPr lang="en-US" dirty="0"/>
+              <a:t>Sample Plot Types</a:t>
+            </a:r>
+          </a:p>
+          <a:p>
+            <a:r>
+              <a:rPr lang="en-US" dirty="0"/>
+              <a:t>Subplots</a:t>
+            </a:r>
+          </a:p>
+          <a:p>
+            <a:r>
+              <a:rPr lang="en-US" dirty="0"/>
+              <a:t>Customization</a:t>
+            </a:r>
+          </a:p>
+          <a:p>
             <a:endParaRPr lang="en-US" dirty="0"/>
           </a:p>
         </p:txBody>
@@ -6599,6 +6629,568 @@
 </file>
 
 <file path=ppt/slides/slide3.xml><?xml version="1.0" encoding="utf-8"?>
+<p:sld xmlns:a="http://schemas.openxmlformats.org/drawingml/2006/main" xmlns:r="http://schemas.openxmlformats.org/officeDocument/2006/relationships" xmlns:p="http://schemas.openxmlformats.org/presentationml/2006/main">
+  <p:cSld>
+    <p:bg>
+      <p:bgPr>
+        <a:blipFill dpi="0" rotWithShape="1">
+          <a:blip r:embed="rId2">
+            <a:lum/>
+          </a:blip>
+          <a:srcRect/>
+          <a:stretch>
+            <a:fillRect l="-10000" r="-10000"/>
+          </a:stretch>
+        </a:blipFill>
+        <a:effectLst/>
+      </p:bgPr>
+    </p:bg>
+    <p:spTree>
+      <p:nvGrpSpPr>
+        <p:cNvPr id="1" name=""/>
+        <p:cNvGrpSpPr/>
+        <p:nvPr/>
+      </p:nvGrpSpPr>
+      <p:grpSpPr>
+        <a:xfrm>
+          <a:off x="0" y="0"/>
+          <a:ext cx="0" cy="0"/>
+          <a:chOff x="0" y="0"/>
+          <a:chExt cx="0" cy="0"/>
+        </a:xfrm>
+      </p:grpSpPr>
+      <p:sp>
+        <p:nvSpPr>
+          <p:cNvPr id="2" name="Title 1"/>
+          <p:cNvSpPr>
+            <a:spLocks noGrp="1"/>
+          </p:cNvSpPr>
+          <p:nvPr>
+            <p:ph type="title"/>
+          </p:nvPr>
+        </p:nvSpPr>
+        <p:spPr/>
+        <p:txBody>
+          <a:bodyPr/>
+          <a:lstStyle/>
+          <a:p>
+            <a:r>
+              <a:rPr lang="en-US" dirty="0"/>
+              <a:t>Basic Plotting</a:t>
+            </a:r>
+          </a:p>
+        </p:txBody>
+      </p:sp>
+      <p:sp>
+        <p:nvSpPr>
+          <p:cNvPr id="3" name="Content Placeholder 2"/>
+          <p:cNvSpPr>
+            <a:spLocks noGrp="1"/>
+          </p:cNvSpPr>
+          <p:nvPr>
+            <p:ph idx="1"/>
+          </p:nvPr>
+        </p:nvSpPr>
+        <p:spPr/>
+        <p:txBody>
+          <a:bodyPr/>
+          <a:lstStyle/>
+          <a:p>
+            <a:r>
+              <a:rPr lang="en-US" dirty="0"/>
+              <a:t>Utilize scatterplot for basics</a:t>
+            </a:r>
+          </a:p>
+          <a:p>
+            <a:endParaRPr lang="en-US" dirty="0"/>
+          </a:p>
+          <a:p>
+            <a:endParaRPr lang="en-US" dirty="0"/>
+          </a:p>
+        </p:txBody>
+      </p:sp>
+    </p:spTree>
+    <p:extLst>
+      <p:ext uri="{BB962C8B-B14F-4D97-AF65-F5344CB8AC3E}">
+        <p14:creationId xmlns:p14="http://schemas.microsoft.com/office/powerpoint/2010/main" val="3372814274"/>
+      </p:ext>
+    </p:extLst>
+  </p:cSld>
+  <p:clrMapOvr>
+    <a:masterClrMapping/>
+  </p:clrMapOvr>
+</p:sld>
+</file>
+
+<file path=ppt/slides/slide4.xml><?xml version="1.0" encoding="utf-8"?>
+<p:sld xmlns:a="http://schemas.openxmlformats.org/drawingml/2006/main" xmlns:r="http://schemas.openxmlformats.org/officeDocument/2006/relationships" xmlns:p="http://schemas.openxmlformats.org/presentationml/2006/main">
+  <p:cSld>
+    <p:bg>
+      <p:bgPr>
+        <a:blipFill dpi="0" rotWithShape="1">
+          <a:blip r:embed="rId2">
+            <a:lum/>
+          </a:blip>
+          <a:srcRect/>
+          <a:stretch>
+            <a:fillRect l="-10000" r="-10000"/>
+          </a:stretch>
+        </a:blipFill>
+        <a:effectLst/>
+      </p:bgPr>
+    </p:bg>
+    <p:spTree>
+      <p:nvGrpSpPr>
+        <p:cNvPr id="1" name=""/>
+        <p:cNvGrpSpPr/>
+        <p:nvPr/>
+      </p:nvGrpSpPr>
+      <p:grpSpPr>
+        <a:xfrm>
+          <a:off x="0" y="0"/>
+          <a:ext cx="0" cy="0"/>
+          <a:chOff x="0" y="0"/>
+          <a:chExt cx="0" cy="0"/>
+        </a:xfrm>
+      </p:grpSpPr>
+      <p:sp>
+        <p:nvSpPr>
+          <p:cNvPr id="2" name="Title 1"/>
+          <p:cNvSpPr>
+            <a:spLocks noGrp="1"/>
+          </p:cNvSpPr>
+          <p:nvPr>
+            <p:ph type="title"/>
+          </p:nvPr>
+        </p:nvSpPr>
+        <p:spPr/>
+        <p:txBody>
+          <a:bodyPr/>
+          <a:lstStyle/>
+          <a:p>
+            <a:r>
+              <a:rPr lang="en-US" dirty="0"/>
+              <a:t>Sample Plot Types</a:t>
+            </a:r>
+          </a:p>
+        </p:txBody>
+      </p:sp>
+      <p:sp>
+        <p:nvSpPr>
+          <p:cNvPr id="3" name="Content Placeholder 2"/>
+          <p:cNvSpPr>
+            <a:spLocks noGrp="1"/>
+          </p:cNvSpPr>
+          <p:nvPr>
+            <p:ph idx="1"/>
+          </p:nvPr>
+        </p:nvSpPr>
+        <p:spPr/>
+        <p:txBody>
+          <a:bodyPr/>
+          <a:lstStyle/>
+          <a:p>
+            <a:r>
+              <a:rPr lang="en-US" dirty="0"/>
+              <a:t>Scatter Plot</a:t>
+            </a:r>
+          </a:p>
+          <a:p>
+            <a:r>
+              <a:rPr lang="en-US" dirty="0"/>
+              <a:t>Pie Chart</a:t>
+            </a:r>
+          </a:p>
+          <a:p>
+            <a:r>
+              <a:rPr lang="en-US" dirty="0"/>
+              <a:t>Bar Graph</a:t>
+            </a:r>
+          </a:p>
+          <a:p>
+            <a:r>
+              <a:rPr lang="en-US"/>
+              <a:t>Histogram</a:t>
+            </a:r>
+          </a:p>
+          <a:p>
+            <a:endParaRPr lang="en-US" dirty="0"/>
+          </a:p>
+          <a:p>
+            <a:r>
+              <a:rPr lang="en-US" dirty="0"/>
+              <a:t>Polar</a:t>
+            </a:r>
+          </a:p>
+          <a:p>
+            <a:r>
+              <a:rPr lang="en-US" dirty="0"/>
+              <a:t>Polar Bar</a:t>
+            </a:r>
+          </a:p>
+          <a:p>
+            <a:endParaRPr lang="en-US" dirty="0"/>
+          </a:p>
+          <a:p>
+            <a:endParaRPr lang="en-US" dirty="0"/>
+          </a:p>
+        </p:txBody>
+      </p:sp>
+    </p:spTree>
+    <p:extLst>
+      <p:ext uri="{BB962C8B-B14F-4D97-AF65-F5344CB8AC3E}">
+        <p14:creationId xmlns:p14="http://schemas.microsoft.com/office/powerpoint/2010/main" val="1084979337"/>
+      </p:ext>
+    </p:extLst>
+  </p:cSld>
+  <p:clrMapOvr>
+    <a:masterClrMapping/>
+  </p:clrMapOvr>
+</p:sld>
+</file>
+
+<file path=ppt/slides/slide5.xml><?xml version="1.0" encoding="utf-8"?>
+<p:sld xmlns:a="http://schemas.openxmlformats.org/drawingml/2006/main" xmlns:r="http://schemas.openxmlformats.org/officeDocument/2006/relationships" xmlns:p="http://schemas.openxmlformats.org/presentationml/2006/main">
+  <p:cSld>
+    <p:bg>
+      <p:bgPr>
+        <a:blipFill dpi="0" rotWithShape="1">
+          <a:blip r:embed="rId2">
+            <a:lum/>
+          </a:blip>
+          <a:srcRect/>
+          <a:stretch>
+            <a:fillRect l="-10000" r="-10000"/>
+          </a:stretch>
+        </a:blipFill>
+        <a:effectLst/>
+      </p:bgPr>
+    </p:bg>
+    <p:spTree>
+      <p:nvGrpSpPr>
+        <p:cNvPr id="1" name=""/>
+        <p:cNvGrpSpPr/>
+        <p:nvPr/>
+      </p:nvGrpSpPr>
+      <p:grpSpPr>
+        <a:xfrm>
+          <a:off x="0" y="0"/>
+          <a:ext cx="0" cy="0"/>
+          <a:chOff x="0" y="0"/>
+          <a:chExt cx="0" cy="0"/>
+        </a:xfrm>
+      </p:grpSpPr>
+      <p:sp>
+        <p:nvSpPr>
+          <p:cNvPr id="2" name="Title 1"/>
+          <p:cNvSpPr>
+            <a:spLocks noGrp="1"/>
+          </p:cNvSpPr>
+          <p:nvPr>
+            <p:ph type="title"/>
+          </p:nvPr>
+        </p:nvSpPr>
+        <p:spPr/>
+        <p:txBody>
+          <a:bodyPr/>
+          <a:lstStyle/>
+          <a:p>
+            <a:r>
+              <a:rPr lang="en-US" dirty="0"/>
+              <a:t>Subplots</a:t>
+            </a:r>
+          </a:p>
+        </p:txBody>
+      </p:sp>
+      <p:sp>
+        <p:nvSpPr>
+          <p:cNvPr id="3" name="Content Placeholder 2"/>
+          <p:cNvSpPr>
+            <a:spLocks noGrp="1"/>
+          </p:cNvSpPr>
+          <p:nvPr>
+            <p:ph idx="1"/>
+          </p:nvPr>
+        </p:nvSpPr>
+        <p:spPr/>
+        <p:txBody>
+          <a:bodyPr/>
+          <a:lstStyle/>
+          <a:p>
+            <a:endParaRPr lang="en-US" dirty="0"/>
+          </a:p>
+        </p:txBody>
+      </p:sp>
+    </p:spTree>
+    <p:extLst>
+      <p:ext uri="{BB962C8B-B14F-4D97-AF65-F5344CB8AC3E}">
+        <p14:creationId xmlns:p14="http://schemas.microsoft.com/office/powerpoint/2010/main" val="3372831229"/>
+      </p:ext>
+    </p:extLst>
+  </p:cSld>
+  <p:clrMapOvr>
+    <a:masterClrMapping/>
+  </p:clrMapOvr>
+</p:sld>
+</file>
+
+<file path=ppt/slides/slide6.xml><?xml version="1.0" encoding="utf-8"?>
+<p:sld xmlns:a="http://schemas.openxmlformats.org/drawingml/2006/main" xmlns:r="http://schemas.openxmlformats.org/officeDocument/2006/relationships" xmlns:p="http://schemas.openxmlformats.org/presentationml/2006/main">
+  <p:cSld>
+    <p:bg>
+      <p:bgPr>
+        <a:blipFill dpi="0" rotWithShape="1">
+          <a:blip r:embed="rId2">
+            <a:lum/>
+          </a:blip>
+          <a:srcRect/>
+          <a:stretch>
+            <a:fillRect l="-10000" r="-10000"/>
+          </a:stretch>
+        </a:blipFill>
+        <a:effectLst/>
+      </p:bgPr>
+    </p:bg>
+    <p:spTree>
+      <p:nvGrpSpPr>
+        <p:cNvPr id="1" name=""/>
+        <p:cNvGrpSpPr/>
+        <p:nvPr/>
+      </p:nvGrpSpPr>
+      <p:grpSpPr>
+        <a:xfrm>
+          <a:off x="0" y="0"/>
+          <a:ext cx="0" cy="0"/>
+          <a:chOff x="0" y="0"/>
+          <a:chExt cx="0" cy="0"/>
+        </a:xfrm>
+      </p:grpSpPr>
+      <p:sp>
+        <p:nvSpPr>
+          <p:cNvPr id="2" name="Title 1"/>
+          <p:cNvSpPr>
+            <a:spLocks noGrp="1"/>
+          </p:cNvSpPr>
+          <p:nvPr>
+            <p:ph type="title"/>
+          </p:nvPr>
+        </p:nvSpPr>
+        <p:spPr/>
+        <p:txBody>
+          <a:bodyPr/>
+          <a:lstStyle/>
+          <a:p>
+            <a:r>
+              <a:rPr lang="en-US" dirty="0"/>
+              <a:t>Customization</a:t>
+            </a:r>
+          </a:p>
+        </p:txBody>
+      </p:sp>
+      <p:sp>
+        <p:nvSpPr>
+          <p:cNvPr id="3" name="Content Placeholder 2"/>
+          <p:cNvSpPr>
+            <a:spLocks noGrp="1"/>
+          </p:cNvSpPr>
+          <p:nvPr>
+            <p:ph idx="1"/>
+          </p:nvPr>
+        </p:nvSpPr>
+        <p:spPr/>
+        <p:txBody>
+          <a:bodyPr/>
+          <a:lstStyle/>
+          <a:p>
+            <a:endParaRPr lang="en-US" dirty="0"/>
+          </a:p>
+        </p:txBody>
+      </p:sp>
+    </p:spTree>
+    <p:extLst>
+      <p:ext uri="{BB962C8B-B14F-4D97-AF65-F5344CB8AC3E}">
+        <p14:creationId xmlns:p14="http://schemas.microsoft.com/office/powerpoint/2010/main" val="102948992"/>
+      </p:ext>
+    </p:extLst>
+  </p:cSld>
+  <p:clrMapOvr>
+    <a:masterClrMapping/>
+  </p:clrMapOvr>
+</p:sld>
+</file>
+
+<file path=ppt/slides/slide7.xml><?xml version="1.0" encoding="utf-8"?>
+<p:sld xmlns:a="http://schemas.openxmlformats.org/drawingml/2006/main" xmlns:r="http://schemas.openxmlformats.org/officeDocument/2006/relationships" xmlns:p="http://schemas.openxmlformats.org/presentationml/2006/main">
+  <p:cSld>
+    <p:bg>
+      <p:bgPr>
+        <a:blipFill dpi="0" rotWithShape="1">
+          <a:blip r:embed="rId2">
+            <a:lum/>
+          </a:blip>
+          <a:srcRect/>
+          <a:stretch>
+            <a:fillRect l="-10000" r="-10000"/>
+          </a:stretch>
+        </a:blipFill>
+        <a:effectLst/>
+      </p:bgPr>
+    </p:bg>
+    <p:spTree>
+      <p:nvGrpSpPr>
+        <p:cNvPr id="1" name=""/>
+        <p:cNvGrpSpPr/>
+        <p:nvPr/>
+      </p:nvGrpSpPr>
+      <p:grpSpPr>
+        <a:xfrm>
+          <a:off x="0" y="0"/>
+          <a:ext cx="0" cy="0"/>
+          <a:chOff x="0" y="0"/>
+          <a:chExt cx="0" cy="0"/>
+        </a:xfrm>
+      </p:grpSpPr>
+      <p:sp>
+        <p:nvSpPr>
+          <p:cNvPr id="2" name="Title 1"/>
+          <p:cNvSpPr>
+            <a:spLocks noGrp="1"/>
+          </p:cNvSpPr>
+          <p:nvPr>
+            <p:ph type="title"/>
+          </p:nvPr>
+        </p:nvSpPr>
+        <p:spPr/>
+        <p:txBody>
+          <a:bodyPr/>
+          <a:lstStyle/>
+          <a:p>
+            <a:r>
+              <a:rPr lang="en-US" dirty="0"/>
+              <a:t>Free Data Sets</a:t>
+            </a:r>
+          </a:p>
+        </p:txBody>
+      </p:sp>
+      <p:sp>
+        <p:nvSpPr>
+          <p:cNvPr id="3" name="Content Placeholder 2"/>
+          <p:cNvSpPr>
+            <a:spLocks noGrp="1"/>
+          </p:cNvSpPr>
+          <p:nvPr>
+            <p:ph idx="1"/>
+          </p:nvPr>
+        </p:nvSpPr>
+        <p:spPr/>
+        <p:txBody>
+          <a:bodyPr/>
+          <a:lstStyle/>
+          <a:p>
+            <a:r>
+              <a:rPr lang="en-US" dirty="0"/>
+              <a:t>https://data.oecd.org/price/inflation-cpi.htm</a:t>
+            </a:r>
+          </a:p>
+          <a:p>
+            <a:endParaRPr lang="en-US" dirty="0"/>
+          </a:p>
+        </p:txBody>
+      </p:sp>
+    </p:spTree>
+    <p:extLst>
+      <p:ext uri="{BB962C8B-B14F-4D97-AF65-F5344CB8AC3E}">
+        <p14:creationId xmlns:p14="http://schemas.microsoft.com/office/powerpoint/2010/main" val="1586468535"/>
+      </p:ext>
+    </p:extLst>
+  </p:cSld>
+  <p:clrMapOvr>
+    <a:masterClrMapping/>
+  </p:clrMapOvr>
+</p:sld>
+</file>
+
+<file path=ppt/slides/slide8.xml><?xml version="1.0" encoding="utf-8"?>
+<p:sld xmlns:a="http://schemas.openxmlformats.org/drawingml/2006/main" xmlns:r="http://schemas.openxmlformats.org/officeDocument/2006/relationships" xmlns:p="http://schemas.openxmlformats.org/presentationml/2006/main">
+  <p:cSld>
+    <p:spTree>
+      <p:nvGrpSpPr>
+        <p:cNvPr id="1" name=""/>
+        <p:cNvGrpSpPr/>
+        <p:nvPr/>
+      </p:nvGrpSpPr>
+      <p:grpSpPr>
+        <a:xfrm>
+          <a:off x="0" y="0"/>
+          <a:ext cx="0" cy="0"/>
+          <a:chOff x="0" y="0"/>
+          <a:chExt cx="0" cy="0"/>
+        </a:xfrm>
+      </p:grpSpPr>
+      <p:sp>
+        <p:nvSpPr>
+          <p:cNvPr id="2" name="Title 1">
+            <a:extLst>
+              <a:ext uri="{FF2B5EF4-FFF2-40B4-BE49-F238E27FC236}">
+                <a16:creationId xmlns:a16="http://schemas.microsoft.com/office/drawing/2014/main" id="{7F6889DD-94F1-492C-B82C-FA8CEB878D3B}"/>
+              </a:ext>
+            </a:extLst>
+          </p:cNvPr>
+          <p:cNvSpPr>
+            <a:spLocks noGrp="1"/>
+          </p:cNvSpPr>
+          <p:nvPr>
+            <p:ph type="title"/>
+          </p:nvPr>
+        </p:nvSpPr>
+        <p:spPr/>
+        <p:txBody>
+          <a:bodyPr/>
+          <a:lstStyle/>
+          <a:p>
+            <a:endParaRPr lang="en-US"/>
+          </a:p>
+        </p:txBody>
+      </p:sp>
+      <p:sp>
+        <p:nvSpPr>
+          <p:cNvPr id="3" name="Content Placeholder 2">
+            <a:extLst>
+              <a:ext uri="{FF2B5EF4-FFF2-40B4-BE49-F238E27FC236}">
+                <a16:creationId xmlns:a16="http://schemas.microsoft.com/office/drawing/2014/main" id="{C0F9EE15-09CA-4218-98AF-364DBA754681}"/>
+              </a:ext>
+            </a:extLst>
+          </p:cNvPr>
+          <p:cNvSpPr>
+            <a:spLocks noGrp="1"/>
+          </p:cNvSpPr>
+          <p:nvPr>
+            <p:ph idx="1"/>
+          </p:nvPr>
+        </p:nvSpPr>
+        <p:spPr/>
+        <p:txBody>
+          <a:bodyPr/>
+          <a:lstStyle/>
+          <a:p>
+            <a:endParaRPr lang="en-US"/>
+          </a:p>
+        </p:txBody>
+      </p:sp>
+    </p:spTree>
+    <p:extLst>
+      <p:ext uri="{BB962C8B-B14F-4D97-AF65-F5344CB8AC3E}">
+        <p14:creationId xmlns:p14="http://schemas.microsoft.com/office/powerpoint/2010/main" val="2173548295"/>
+      </p:ext>
+    </p:extLst>
+  </p:cSld>
+  <p:clrMapOvr>
+    <a:masterClrMapping/>
+  </p:clrMapOvr>
+</p:sld>
+</file>
+
+<file path=ppt/slides/slide9.xml><?xml version="1.0" encoding="utf-8"?>
 <p:sld xmlns:a="http://schemas.openxmlformats.org/drawingml/2006/main" xmlns:r="http://schemas.openxmlformats.org/officeDocument/2006/relationships" xmlns:p="http://schemas.openxmlformats.org/presentationml/2006/main">
   <p:cSld>
     <p:bg>

</xml_diff>

<commit_message>
Finished powerpoint layout and skeleton.
</commit_message>
<xml_diff>
--- a/Session 7 - Python/Instructional Material/Session 7 - Python Plotting with MatPlotLib.pptx
+++ b/Session 7 - Python/Instructional Material/Session 7 - Python Plotting with MatPlotLib.pptx
@@ -13,8 +13,7 @@
     <p:sldId id="378" r:id="rId7"/>
     <p:sldId id="380" r:id="rId8"/>
     <p:sldId id="381" r:id="rId9"/>
-    <p:sldId id="379" r:id="rId10"/>
-    <p:sldId id="375" r:id="rId11"/>
+    <p:sldId id="375" r:id="rId10"/>
   </p:sldIdLst>
   <p:sldSz cx="9144000" cy="6858000" type="screen4x3"/>
   <p:notesSz cx="6858000" cy="9144000"/>
@@ -311,7 +310,7 @@
           <a:p>
             <a:fld id="{547641E8-73DF-4AD2-848E-3103064331B1}" type="datetimeFigureOut">
               <a:rPr lang="en-US" smtClean="0"/>
-              <a:t>10/11/2021</a:t>
+              <a:t>10/12/2021</a:t>
             </a:fld>
             <a:endParaRPr lang="en-US"/>
           </a:p>
@@ -479,7 +478,7 @@
           <a:p>
             <a:fld id="{547641E8-73DF-4AD2-848E-3103064331B1}" type="datetimeFigureOut">
               <a:rPr lang="en-US" smtClean="0"/>
-              <a:t>10/11/2021</a:t>
+              <a:t>10/12/2021</a:t>
             </a:fld>
             <a:endParaRPr lang="en-US"/>
           </a:p>
@@ -657,7 +656,7 @@
           <a:p>
             <a:fld id="{547641E8-73DF-4AD2-848E-3103064331B1}" type="datetimeFigureOut">
               <a:rPr lang="en-US" smtClean="0"/>
-              <a:t>10/11/2021</a:t>
+              <a:t>10/12/2021</a:t>
             </a:fld>
             <a:endParaRPr lang="en-US"/>
           </a:p>
@@ -904,7 +903,7 @@
                 </a:solidFill>
               </a:rPr>
               <a:pPr/>
-              <a:t>10/11/2021</a:t>
+              <a:t>10/12/2021</a:t>
             </a:fld>
             <a:endParaRPr lang="en-US">
               <a:solidFill>
@@ -1104,7 +1103,7 @@
                 </a:solidFill>
               </a:rPr>
               <a:pPr/>
-              <a:t>10/11/2021</a:t>
+              <a:t>10/12/2021</a:t>
             </a:fld>
             <a:endParaRPr lang="en-US">
               <a:solidFill>
@@ -1381,7 +1380,7 @@
                 </a:solidFill>
               </a:rPr>
               <a:pPr/>
-              <a:t>10/11/2021</a:t>
+              <a:t>10/12/2021</a:t>
             </a:fld>
             <a:endParaRPr lang="en-US">
               <a:solidFill>
@@ -1698,7 +1697,7 @@
                 </a:solidFill>
               </a:rPr>
               <a:pPr/>
-              <a:t>10/11/2021</a:t>
+              <a:t>10/12/2021</a:t>
             </a:fld>
             <a:endParaRPr lang="en-US">
               <a:solidFill>
@@ -2149,7 +2148,7 @@
                 </a:solidFill>
               </a:rPr>
               <a:pPr/>
-              <a:t>10/11/2021</a:t>
+              <a:t>10/12/2021</a:t>
             </a:fld>
             <a:endParaRPr lang="en-US">
               <a:solidFill>
@@ -2298,7 +2297,7 @@
                 </a:solidFill>
               </a:rPr>
               <a:pPr/>
-              <a:t>10/11/2021</a:t>
+              <a:t>10/12/2021</a:t>
             </a:fld>
             <a:endParaRPr lang="en-US">
               <a:solidFill>
@@ -2425,7 +2424,7 @@
                 </a:solidFill>
               </a:rPr>
               <a:pPr/>
-              <a:t>10/11/2021</a:t>
+              <a:t>10/12/2021</a:t>
             </a:fld>
             <a:endParaRPr lang="en-US">
               <a:solidFill>
@@ -2732,7 +2731,7 @@
                 </a:solidFill>
               </a:rPr>
               <a:pPr/>
-              <a:t>10/11/2021</a:t>
+              <a:t>10/12/2021</a:t>
             </a:fld>
             <a:endParaRPr lang="en-US">
               <a:solidFill>
@@ -2925,7 +2924,7 @@
           <a:p>
             <a:fld id="{547641E8-73DF-4AD2-848E-3103064331B1}" type="datetimeFigureOut">
               <a:rPr lang="en-US" smtClean="0"/>
-              <a:t>10/11/2021</a:t>
+              <a:t>10/12/2021</a:t>
             </a:fld>
             <a:endParaRPr lang="en-US"/>
           </a:p>
@@ -3184,7 +3183,7 @@
                 </a:solidFill>
               </a:rPr>
               <a:pPr/>
-              <a:t>10/11/2021</a:t>
+              <a:t>10/12/2021</a:t>
             </a:fld>
             <a:endParaRPr lang="en-US">
               <a:solidFill>
@@ -3384,7 +3383,7 @@
                 </a:solidFill>
               </a:rPr>
               <a:pPr/>
-              <a:t>10/11/2021</a:t>
+              <a:t>10/12/2021</a:t>
             </a:fld>
             <a:endParaRPr lang="en-US">
               <a:solidFill>
@@ -3594,7 +3593,7 @@
                 </a:solidFill>
               </a:rPr>
               <a:pPr/>
-              <a:t>10/11/2021</a:t>
+              <a:t>10/12/2021</a:t>
             </a:fld>
             <a:endParaRPr lang="en-US">
               <a:solidFill>
@@ -3864,7 +3863,7 @@
           <a:p>
             <a:fld id="{547641E8-73DF-4AD2-848E-3103064331B1}" type="datetimeFigureOut">
               <a:rPr lang="en-US" smtClean="0"/>
-              <a:t>10/11/2021</a:t>
+              <a:t>10/12/2021</a:t>
             </a:fld>
             <a:endParaRPr lang="en-US"/>
           </a:p>
@@ -4149,7 +4148,7 @@
           <a:p>
             <a:fld id="{547641E8-73DF-4AD2-848E-3103064331B1}" type="datetimeFigureOut">
               <a:rPr lang="en-US" smtClean="0"/>
-              <a:t>10/11/2021</a:t>
+              <a:t>10/12/2021</a:t>
             </a:fld>
             <a:endParaRPr lang="en-US"/>
           </a:p>
@@ -4568,7 +4567,7 @@
           <a:p>
             <a:fld id="{547641E8-73DF-4AD2-848E-3103064331B1}" type="datetimeFigureOut">
               <a:rPr lang="en-US" smtClean="0"/>
-              <a:t>10/11/2021</a:t>
+              <a:t>10/12/2021</a:t>
             </a:fld>
             <a:endParaRPr lang="en-US"/>
           </a:p>
@@ -4685,7 +4684,7 @@
           <a:p>
             <a:fld id="{547641E8-73DF-4AD2-848E-3103064331B1}" type="datetimeFigureOut">
               <a:rPr lang="en-US" smtClean="0"/>
-              <a:t>10/11/2021</a:t>
+              <a:t>10/12/2021</a:t>
             </a:fld>
             <a:endParaRPr lang="en-US"/>
           </a:p>
@@ -4780,7 +4779,7 @@
           <a:p>
             <a:fld id="{547641E8-73DF-4AD2-848E-3103064331B1}" type="datetimeFigureOut">
               <a:rPr lang="en-US" smtClean="0"/>
-              <a:t>10/11/2021</a:t>
+              <a:t>10/12/2021</a:t>
             </a:fld>
             <a:endParaRPr lang="en-US"/>
           </a:p>
@@ -5055,7 +5054,7 @@
           <a:p>
             <a:fld id="{547641E8-73DF-4AD2-848E-3103064331B1}" type="datetimeFigureOut">
               <a:rPr lang="en-US" smtClean="0"/>
-              <a:t>10/11/2021</a:t>
+              <a:t>10/12/2021</a:t>
             </a:fld>
             <a:endParaRPr lang="en-US"/>
           </a:p>
@@ -5307,7 +5306,7 @@
           <a:p>
             <a:fld id="{547641E8-73DF-4AD2-848E-3103064331B1}" type="datetimeFigureOut">
               <a:rPr lang="en-US" smtClean="0"/>
-              <a:t>10/11/2021</a:t>
+              <a:t>10/12/2021</a:t>
             </a:fld>
             <a:endParaRPr lang="en-US"/>
           </a:p>
@@ -5521,7 +5520,7 @@
           <a:p>
             <a:fld id="{547641E8-73DF-4AD2-848E-3103064331B1}" type="datetimeFigureOut">
               <a:rPr lang="en-US" smtClean="0"/>
-              <a:t>10/11/2021</a:t>
+              <a:t>10/12/2021</a:t>
             </a:fld>
             <a:endParaRPr lang="en-US"/>
           </a:p>
@@ -6036,7 +6035,7 @@
                 </a:solidFill>
               </a:rPr>
               <a:pPr/>
-              <a:t>10/11/2021</a:t>
+              <a:t>10/12/2021</a:t>
             </a:fld>
             <a:endParaRPr lang="en-US">
               <a:solidFill>
@@ -6693,12 +6692,56 @@
         </p:nvSpPr>
         <p:spPr/>
         <p:txBody>
-          <a:bodyPr/>
+          <a:bodyPr>
+            <a:normAutofit lnSpcReduction="10000"/>
+          </a:bodyPr>
           <a:lstStyle/>
           <a:p>
             <a:r>
               <a:rPr lang="en-US" dirty="0"/>
               <a:t>Utilize scatterplot for basics</a:t>
+            </a:r>
+          </a:p>
+          <a:p>
+            <a:r>
+              <a:rPr lang="en-US" dirty="0"/>
+              <a:t>Plot data</a:t>
+            </a:r>
+          </a:p>
+          <a:p>
+            <a:r>
+              <a:rPr lang="en-US" dirty="0"/>
+              <a:t>Plot multiple lines</a:t>
+            </a:r>
+          </a:p>
+          <a:p>
+            <a:r>
+              <a:rPr lang="en-US" dirty="0"/>
+              <a:t>Change line style</a:t>
+            </a:r>
+          </a:p>
+          <a:p>
+            <a:r>
+              <a:rPr lang="en-US" dirty="0"/>
+              <a:t>Edit axis labels</a:t>
+            </a:r>
+          </a:p>
+          <a:p>
+            <a:r>
+              <a:rPr lang="en-US" dirty="0"/>
+              <a:t>Add text annotation</a:t>
+            </a:r>
+          </a:p>
+          <a:p>
+            <a:r>
+              <a:rPr lang="en-US" dirty="0"/>
+              <a:t>Show plot</a:t>
+            </a:r>
+          </a:p>
+          <a:p>
+            <a:r>
+              <a:rPr lang="en-US" dirty="0"/>
+              <a:t>Export plot to .pdf or other file</a:t>
             </a:r>
           </a:p>
           <a:p>
@@ -6787,7 +6830,9 @@
         </p:nvSpPr>
         <p:spPr/>
         <p:txBody>
-          <a:bodyPr/>
+          <a:bodyPr>
+            <a:normAutofit lnSpcReduction="10000"/>
+          </a:bodyPr>
           <a:lstStyle/>
           <a:p>
             <a:r>
@@ -6808,28 +6853,36 @@
             </a:r>
           </a:p>
           <a:p>
-            <a:r>
-              <a:rPr lang="en-US"/>
+            <a:pPr lvl="1"/>
+            <a:r>
+              <a:rPr lang="en-US" dirty="0"/>
+              <a:t>Vertical</a:t>
+            </a:r>
+          </a:p>
+          <a:p>
+            <a:pPr lvl="1"/>
+            <a:r>
+              <a:rPr lang="en-US" dirty="0"/>
+              <a:t>Horizontal</a:t>
+            </a:r>
+          </a:p>
+          <a:p>
+            <a:r>
+              <a:rPr lang="en-US" dirty="0"/>
               <a:t>Histogram</a:t>
             </a:r>
           </a:p>
           <a:p>
-            <a:endParaRPr lang="en-US" dirty="0"/>
+            <a:r>
+              <a:rPr lang="en-US" dirty="0"/>
+              <a:t>3D</a:t>
+            </a:r>
           </a:p>
           <a:p>
             <a:r>
               <a:rPr lang="en-US" dirty="0"/>
               <a:t>Polar</a:t>
             </a:r>
-          </a:p>
-          <a:p>
-            <a:r>
-              <a:rPr lang="en-US" dirty="0"/>
-              <a:t>Polar Bar</a:t>
-            </a:r>
-          </a:p>
-          <a:p>
-            <a:endParaRPr lang="en-US" dirty="0"/>
           </a:p>
           <a:p>
             <a:endParaRPr lang="en-US" dirty="0"/>
@@ -6917,7 +6970,10 @@
           <a:bodyPr/>
           <a:lstStyle/>
           <a:p>
-            <a:endParaRPr lang="en-US" dirty="0"/>
+            <a:r>
+              <a:rPr lang="en-US" dirty="0"/>
+              <a:t>Multiple plots on same figure</a:t>
+            </a:r>
           </a:p>
         </p:txBody>
       </p:sp>
@@ -7002,7 +7058,17 @@
           <a:bodyPr/>
           <a:lstStyle/>
           <a:p>
-            <a:endParaRPr lang="en-US" dirty="0"/>
+            <a:r>
+              <a:rPr lang="en-US" dirty="0"/>
+              <a:t>Can add events to plots that allow things to happen if a trigger occurs</a:t>
+            </a:r>
+          </a:p>
+          <a:p>
+            <a:pPr lvl="1"/>
+            <a:r>
+              <a:rPr lang="en-US" dirty="0"/>
+              <a:t>Mouse click could change colors or scale</a:t>
+            </a:r>
           </a:p>
         </p:txBody>
       </p:sp>
@@ -7111,86 +7177,6 @@
 </file>
 
 <file path=ppt/slides/slide8.xml><?xml version="1.0" encoding="utf-8"?>
-<p:sld xmlns:a="http://schemas.openxmlformats.org/drawingml/2006/main" xmlns:r="http://schemas.openxmlformats.org/officeDocument/2006/relationships" xmlns:p="http://schemas.openxmlformats.org/presentationml/2006/main">
-  <p:cSld>
-    <p:spTree>
-      <p:nvGrpSpPr>
-        <p:cNvPr id="1" name=""/>
-        <p:cNvGrpSpPr/>
-        <p:nvPr/>
-      </p:nvGrpSpPr>
-      <p:grpSpPr>
-        <a:xfrm>
-          <a:off x="0" y="0"/>
-          <a:ext cx="0" cy="0"/>
-          <a:chOff x="0" y="0"/>
-          <a:chExt cx="0" cy="0"/>
-        </a:xfrm>
-      </p:grpSpPr>
-      <p:sp>
-        <p:nvSpPr>
-          <p:cNvPr id="2" name="Title 1">
-            <a:extLst>
-              <a:ext uri="{FF2B5EF4-FFF2-40B4-BE49-F238E27FC236}">
-                <a16:creationId xmlns:a16="http://schemas.microsoft.com/office/drawing/2014/main" id="{7F6889DD-94F1-492C-B82C-FA8CEB878D3B}"/>
-              </a:ext>
-            </a:extLst>
-          </p:cNvPr>
-          <p:cNvSpPr>
-            <a:spLocks noGrp="1"/>
-          </p:cNvSpPr>
-          <p:nvPr>
-            <p:ph type="title"/>
-          </p:nvPr>
-        </p:nvSpPr>
-        <p:spPr/>
-        <p:txBody>
-          <a:bodyPr/>
-          <a:lstStyle/>
-          <a:p>
-            <a:endParaRPr lang="en-US"/>
-          </a:p>
-        </p:txBody>
-      </p:sp>
-      <p:sp>
-        <p:nvSpPr>
-          <p:cNvPr id="3" name="Content Placeholder 2">
-            <a:extLst>
-              <a:ext uri="{FF2B5EF4-FFF2-40B4-BE49-F238E27FC236}">
-                <a16:creationId xmlns:a16="http://schemas.microsoft.com/office/drawing/2014/main" id="{C0F9EE15-09CA-4218-98AF-364DBA754681}"/>
-              </a:ext>
-            </a:extLst>
-          </p:cNvPr>
-          <p:cNvSpPr>
-            <a:spLocks noGrp="1"/>
-          </p:cNvSpPr>
-          <p:nvPr>
-            <p:ph idx="1"/>
-          </p:nvPr>
-        </p:nvSpPr>
-        <p:spPr/>
-        <p:txBody>
-          <a:bodyPr/>
-          <a:lstStyle/>
-          <a:p>
-            <a:endParaRPr lang="en-US"/>
-          </a:p>
-        </p:txBody>
-      </p:sp>
-    </p:spTree>
-    <p:extLst>
-      <p:ext uri="{BB962C8B-B14F-4D97-AF65-F5344CB8AC3E}">
-        <p14:creationId xmlns:p14="http://schemas.microsoft.com/office/powerpoint/2010/main" val="2173548295"/>
-      </p:ext>
-    </p:extLst>
-  </p:cSld>
-  <p:clrMapOvr>
-    <a:masterClrMapping/>
-  </p:clrMapOvr>
-</p:sld>
-</file>
-
-<file path=ppt/slides/slide9.xml><?xml version="1.0" encoding="utf-8"?>
 <p:sld xmlns:a="http://schemas.openxmlformats.org/drawingml/2006/main" xmlns:r="http://schemas.openxmlformats.org/officeDocument/2006/relationships" xmlns:p="http://schemas.openxmlformats.org/presentationml/2006/main">
   <p:cSld>
     <p:bg>

</xml_diff>

<commit_message>
Added line styling details.
</commit_message>
<xml_diff>
--- a/Session 7 - Python/Instructional Material/Session 7 - Python Plotting with MatPlotLib.pptx
+++ b/Session 7 - Python/Instructional Material/Session 7 - Python Plotting with MatPlotLib.pptx
@@ -6693,7 +6693,7 @@
         <p:spPr/>
         <p:txBody>
           <a:bodyPr>
-            <a:normAutofit lnSpcReduction="10000"/>
+            <a:normAutofit fontScale="85000" lnSpcReduction="20000"/>
           </a:bodyPr>
           <a:lstStyle/>
           <a:p>
@@ -6718,6 +6718,35 @@
             <a:r>
               <a:rPr lang="en-US" dirty="0"/>
               <a:t>Change line style</a:t>
+            </a:r>
+          </a:p>
+          <a:p>
+            <a:pPr lvl="1"/>
+            <a:r>
+              <a:rPr lang="en-US" dirty="0" err="1"/>
+              <a:t>Linestyle</a:t>
+            </a:r>
+            <a:r>
+              <a:rPr lang="en-US" dirty="0"/>
+              <a:t> keyword</a:t>
+            </a:r>
+          </a:p>
+          <a:p>
+            <a:pPr lvl="1"/>
+            <a:r>
+              <a:rPr lang="en-US" dirty="0"/>
+              <a:t>Marker keyword</a:t>
+            </a:r>
+          </a:p>
+          <a:p>
+            <a:pPr lvl="1"/>
+            <a:r>
+              <a:rPr lang="en-US"/>
+              <a:t>Linewidth </a:t>
+            </a:r>
+            <a:r>
+              <a:rPr lang="en-US" dirty="0"/>
+              <a:t>keyword</a:t>
             </a:r>
           </a:p>
           <a:p>

</xml_diff>

<commit_message>
Added example images of plots.
</commit_message>
<xml_diff>
--- a/Session 7 - Python/Instructional Material/Session 7 - Python Plotting with MatPlotLib.pptx
+++ b/Session 7 - Python/Instructional Material/Session 7 - Python Plotting with MatPlotLib.pptx
@@ -10,10 +10,16 @@
     <p:sldId id="282" r:id="rId4"/>
     <p:sldId id="376" r:id="rId5"/>
     <p:sldId id="377" r:id="rId6"/>
-    <p:sldId id="378" r:id="rId7"/>
-    <p:sldId id="380" r:id="rId8"/>
-    <p:sldId id="381" r:id="rId9"/>
-    <p:sldId id="375" r:id="rId10"/>
+    <p:sldId id="386" r:id="rId7"/>
+    <p:sldId id="385" r:id="rId8"/>
+    <p:sldId id="388" r:id="rId9"/>
+    <p:sldId id="384" r:id="rId10"/>
+    <p:sldId id="383" r:id="rId11"/>
+    <p:sldId id="387" r:id="rId12"/>
+    <p:sldId id="378" r:id="rId13"/>
+    <p:sldId id="380" r:id="rId14"/>
+    <p:sldId id="381" r:id="rId15"/>
+    <p:sldId id="375" r:id="rId16"/>
   </p:sldIdLst>
   <p:sldSz cx="9144000" cy="6858000" type="screen4x3"/>
   <p:notesSz cx="6858000" cy="9144000"/>
@@ -310,7 +316,7 @@
           <a:p>
             <a:fld id="{547641E8-73DF-4AD2-848E-3103064331B1}" type="datetimeFigureOut">
               <a:rPr lang="en-US" smtClean="0"/>
-              <a:t>10/12/2021</a:t>
+              <a:t>10/27/2021</a:t>
             </a:fld>
             <a:endParaRPr lang="en-US"/>
           </a:p>
@@ -478,7 +484,7 @@
           <a:p>
             <a:fld id="{547641E8-73DF-4AD2-848E-3103064331B1}" type="datetimeFigureOut">
               <a:rPr lang="en-US" smtClean="0"/>
-              <a:t>10/12/2021</a:t>
+              <a:t>10/27/2021</a:t>
             </a:fld>
             <a:endParaRPr lang="en-US"/>
           </a:p>
@@ -656,7 +662,7 @@
           <a:p>
             <a:fld id="{547641E8-73DF-4AD2-848E-3103064331B1}" type="datetimeFigureOut">
               <a:rPr lang="en-US" smtClean="0"/>
-              <a:t>10/12/2021</a:t>
+              <a:t>10/27/2021</a:t>
             </a:fld>
             <a:endParaRPr lang="en-US"/>
           </a:p>
@@ -903,7 +909,7 @@
                 </a:solidFill>
               </a:rPr>
               <a:pPr/>
-              <a:t>10/12/2021</a:t>
+              <a:t>10/27/2021</a:t>
             </a:fld>
             <a:endParaRPr lang="en-US">
               <a:solidFill>
@@ -1103,7 +1109,7 @@
                 </a:solidFill>
               </a:rPr>
               <a:pPr/>
-              <a:t>10/12/2021</a:t>
+              <a:t>10/27/2021</a:t>
             </a:fld>
             <a:endParaRPr lang="en-US">
               <a:solidFill>
@@ -1380,7 +1386,7 @@
                 </a:solidFill>
               </a:rPr>
               <a:pPr/>
-              <a:t>10/12/2021</a:t>
+              <a:t>10/27/2021</a:t>
             </a:fld>
             <a:endParaRPr lang="en-US">
               <a:solidFill>
@@ -1697,7 +1703,7 @@
                 </a:solidFill>
               </a:rPr>
               <a:pPr/>
-              <a:t>10/12/2021</a:t>
+              <a:t>10/27/2021</a:t>
             </a:fld>
             <a:endParaRPr lang="en-US">
               <a:solidFill>
@@ -2148,7 +2154,7 @@
                 </a:solidFill>
               </a:rPr>
               <a:pPr/>
-              <a:t>10/12/2021</a:t>
+              <a:t>10/27/2021</a:t>
             </a:fld>
             <a:endParaRPr lang="en-US">
               <a:solidFill>
@@ -2297,7 +2303,7 @@
                 </a:solidFill>
               </a:rPr>
               <a:pPr/>
-              <a:t>10/12/2021</a:t>
+              <a:t>10/27/2021</a:t>
             </a:fld>
             <a:endParaRPr lang="en-US">
               <a:solidFill>
@@ -2424,7 +2430,7 @@
                 </a:solidFill>
               </a:rPr>
               <a:pPr/>
-              <a:t>10/12/2021</a:t>
+              <a:t>10/27/2021</a:t>
             </a:fld>
             <a:endParaRPr lang="en-US">
               <a:solidFill>
@@ -2731,7 +2737,7 @@
                 </a:solidFill>
               </a:rPr>
               <a:pPr/>
-              <a:t>10/12/2021</a:t>
+              <a:t>10/27/2021</a:t>
             </a:fld>
             <a:endParaRPr lang="en-US">
               <a:solidFill>
@@ -2924,7 +2930,7 @@
           <a:p>
             <a:fld id="{547641E8-73DF-4AD2-848E-3103064331B1}" type="datetimeFigureOut">
               <a:rPr lang="en-US" smtClean="0"/>
-              <a:t>10/12/2021</a:t>
+              <a:t>10/27/2021</a:t>
             </a:fld>
             <a:endParaRPr lang="en-US"/>
           </a:p>
@@ -3183,7 +3189,7 @@
                 </a:solidFill>
               </a:rPr>
               <a:pPr/>
-              <a:t>10/12/2021</a:t>
+              <a:t>10/27/2021</a:t>
             </a:fld>
             <a:endParaRPr lang="en-US">
               <a:solidFill>
@@ -3383,7 +3389,7 @@
                 </a:solidFill>
               </a:rPr>
               <a:pPr/>
-              <a:t>10/12/2021</a:t>
+              <a:t>10/27/2021</a:t>
             </a:fld>
             <a:endParaRPr lang="en-US">
               <a:solidFill>
@@ -3593,7 +3599,7 @@
                 </a:solidFill>
               </a:rPr>
               <a:pPr/>
-              <a:t>10/12/2021</a:t>
+              <a:t>10/27/2021</a:t>
             </a:fld>
             <a:endParaRPr lang="en-US">
               <a:solidFill>
@@ -3863,7 +3869,7 @@
           <a:p>
             <a:fld id="{547641E8-73DF-4AD2-848E-3103064331B1}" type="datetimeFigureOut">
               <a:rPr lang="en-US" smtClean="0"/>
-              <a:t>10/12/2021</a:t>
+              <a:t>10/27/2021</a:t>
             </a:fld>
             <a:endParaRPr lang="en-US"/>
           </a:p>
@@ -4148,7 +4154,7 @@
           <a:p>
             <a:fld id="{547641E8-73DF-4AD2-848E-3103064331B1}" type="datetimeFigureOut">
               <a:rPr lang="en-US" smtClean="0"/>
-              <a:t>10/12/2021</a:t>
+              <a:t>10/27/2021</a:t>
             </a:fld>
             <a:endParaRPr lang="en-US"/>
           </a:p>
@@ -4567,7 +4573,7 @@
           <a:p>
             <a:fld id="{547641E8-73DF-4AD2-848E-3103064331B1}" type="datetimeFigureOut">
               <a:rPr lang="en-US" smtClean="0"/>
-              <a:t>10/12/2021</a:t>
+              <a:t>10/27/2021</a:t>
             </a:fld>
             <a:endParaRPr lang="en-US"/>
           </a:p>
@@ -4684,7 +4690,7 @@
           <a:p>
             <a:fld id="{547641E8-73DF-4AD2-848E-3103064331B1}" type="datetimeFigureOut">
               <a:rPr lang="en-US" smtClean="0"/>
-              <a:t>10/12/2021</a:t>
+              <a:t>10/27/2021</a:t>
             </a:fld>
             <a:endParaRPr lang="en-US"/>
           </a:p>
@@ -4779,7 +4785,7 @@
           <a:p>
             <a:fld id="{547641E8-73DF-4AD2-848E-3103064331B1}" type="datetimeFigureOut">
               <a:rPr lang="en-US" smtClean="0"/>
-              <a:t>10/12/2021</a:t>
+              <a:t>10/27/2021</a:t>
             </a:fld>
             <a:endParaRPr lang="en-US"/>
           </a:p>
@@ -5054,7 +5060,7 @@
           <a:p>
             <a:fld id="{547641E8-73DF-4AD2-848E-3103064331B1}" type="datetimeFigureOut">
               <a:rPr lang="en-US" smtClean="0"/>
-              <a:t>10/12/2021</a:t>
+              <a:t>10/27/2021</a:t>
             </a:fld>
             <a:endParaRPr lang="en-US"/>
           </a:p>
@@ -5306,7 +5312,7 @@
           <a:p>
             <a:fld id="{547641E8-73DF-4AD2-848E-3103064331B1}" type="datetimeFigureOut">
               <a:rPr lang="en-US" smtClean="0"/>
-              <a:t>10/12/2021</a:t>
+              <a:t>10/27/2021</a:t>
             </a:fld>
             <a:endParaRPr lang="en-US"/>
           </a:p>
@@ -5520,7 +5526,7 @@
           <a:p>
             <a:fld id="{547641E8-73DF-4AD2-848E-3103064331B1}" type="datetimeFigureOut">
               <a:rPr lang="en-US" smtClean="0"/>
-              <a:t>10/12/2021</a:t>
+              <a:t>10/27/2021</a:t>
             </a:fld>
             <a:endParaRPr lang="en-US"/>
           </a:p>
@@ -6035,7 +6041,7 @@
                 </a:solidFill>
               </a:rPr>
               <a:pPr/>
-              <a:t>10/12/2021</a:t>
+              <a:t>10/27/2021</a:t>
             </a:fld>
             <a:endParaRPr lang="en-US">
               <a:solidFill>
@@ -6508,6 +6514,541 @@
 </p:sld>
 </file>
 
+<file path=ppt/slides/slide10.xml><?xml version="1.0" encoding="utf-8"?>
+<p:sld xmlns:a="http://schemas.openxmlformats.org/drawingml/2006/main" xmlns:r="http://schemas.openxmlformats.org/officeDocument/2006/relationships" xmlns:p="http://schemas.openxmlformats.org/presentationml/2006/main">
+  <p:cSld>
+    <p:bg>
+      <p:bgPr>
+        <a:blipFill dpi="0" rotWithShape="1">
+          <a:blip r:embed="rId2">
+            <a:lum/>
+          </a:blip>
+          <a:srcRect/>
+          <a:stretch>
+            <a:fillRect l="-10000" r="-10000"/>
+          </a:stretch>
+        </a:blipFill>
+        <a:effectLst/>
+      </p:bgPr>
+    </p:bg>
+    <p:spTree>
+      <p:nvGrpSpPr>
+        <p:cNvPr id="1" name=""/>
+        <p:cNvGrpSpPr/>
+        <p:nvPr/>
+      </p:nvGrpSpPr>
+      <p:grpSpPr>
+        <a:xfrm>
+          <a:off x="0" y="0"/>
+          <a:ext cx="0" cy="0"/>
+          <a:chOff x="0" y="0"/>
+          <a:chExt cx="0" cy="0"/>
+        </a:xfrm>
+      </p:grpSpPr>
+      <p:sp>
+        <p:nvSpPr>
+          <p:cNvPr id="2" name="Title 1"/>
+          <p:cNvSpPr>
+            <a:spLocks noGrp="1"/>
+          </p:cNvSpPr>
+          <p:nvPr>
+            <p:ph type="title"/>
+          </p:nvPr>
+        </p:nvSpPr>
+        <p:spPr/>
+        <p:txBody>
+          <a:bodyPr/>
+          <a:lstStyle/>
+          <a:p>
+            <a:r>
+              <a:rPr lang="en-US" dirty="0"/>
+              <a:t>Sample Plot Types</a:t>
+            </a:r>
+          </a:p>
+        </p:txBody>
+      </p:sp>
+      <p:sp>
+        <p:nvSpPr>
+          <p:cNvPr id="3" name="Content Placeholder 2"/>
+          <p:cNvSpPr>
+            <a:spLocks noGrp="1"/>
+          </p:cNvSpPr>
+          <p:nvPr>
+            <p:ph idx="1"/>
+          </p:nvPr>
+        </p:nvSpPr>
+        <p:spPr/>
+        <p:txBody>
+          <a:bodyPr>
+            <a:normAutofit/>
+          </a:bodyPr>
+          <a:lstStyle/>
+          <a:p>
+            <a:r>
+              <a:rPr lang="en-US" dirty="0"/>
+              <a:t>Polar</a:t>
+            </a:r>
+          </a:p>
+          <a:p>
+            <a:endParaRPr lang="en-US" dirty="0"/>
+          </a:p>
+        </p:txBody>
+      </p:sp>
+      <p:pic>
+        <p:nvPicPr>
+          <p:cNvPr id="5" name="Picture 4">
+            <a:extLst>
+              <a:ext uri="{FF2B5EF4-FFF2-40B4-BE49-F238E27FC236}">
+                <a16:creationId xmlns:a16="http://schemas.microsoft.com/office/drawing/2014/main" id="{1F152597-ADE2-49CF-A924-AFF9B90AEC76}"/>
+              </a:ext>
+            </a:extLst>
+          </p:cNvPr>
+          <p:cNvPicPr>
+            <a:picLocks noChangeAspect="1"/>
+          </p:cNvPicPr>
+          <p:nvPr/>
+        </p:nvPicPr>
+        <p:blipFill>
+          <a:blip r:embed="rId3"/>
+          <a:stretch>
+            <a:fillRect/>
+          </a:stretch>
+        </p:blipFill>
+        <p:spPr>
+          <a:xfrm>
+            <a:off x="2812649" y="2667000"/>
+            <a:ext cx="3518702" cy="3417078"/>
+          </a:xfrm>
+          <a:prstGeom prst="rect">
+            <a:avLst/>
+          </a:prstGeom>
+        </p:spPr>
+      </p:pic>
+    </p:spTree>
+    <p:extLst>
+      <p:ext uri="{BB962C8B-B14F-4D97-AF65-F5344CB8AC3E}">
+        <p14:creationId xmlns:p14="http://schemas.microsoft.com/office/powerpoint/2010/main" val="2465112248"/>
+      </p:ext>
+    </p:extLst>
+  </p:cSld>
+  <p:clrMapOvr>
+    <a:masterClrMapping/>
+  </p:clrMapOvr>
+</p:sld>
+</file>
+
+<file path=ppt/slides/slide11.xml><?xml version="1.0" encoding="utf-8"?>
+<p:sld xmlns:a="http://schemas.openxmlformats.org/drawingml/2006/main" xmlns:r="http://schemas.openxmlformats.org/officeDocument/2006/relationships" xmlns:p="http://schemas.openxmlformats.org/presentationml/2006/main">
+  <p:cSld>
+    <p:bg>
+      <p:bgPr>
+        <a:blipFill dpi="0" rotWithShape="1">
+          <a:blip r:embed="rId2">
+            <a:lum/>
+          </a:blip>
+          <a:srcRect/>
+          <a:stretch>
+            <a:fillRect l="-10000" r="-10000"/>
+          </a:stretch>
+        </a:blipFill>
+        <a:effectLst/>
+      </p:bgPr>
+    </p:bg>
+    <p:spTree>
+      <p:nvGrpSpPr>
+        <p:cNvPr id="1" name=""/>
+        <p:cNvGrpSpPr/>
+        <p:nvPr/>
+      </p:nvGrpSpPr>
+      <p:grpSpPr>
+        <a:xfrm>
+          <a:off x="0" y="0"/>
+          <a:ext cx="0" cy="0"/>
+          <a:chOff x="0" y="0"/>
+          <a:chExt cx="0" cy="0"/>
+        </a:xfrm>
+      </p:grpSpPr>
+      <p:sp>
+        <p:nvSpPr>
+          <p:cNvPr id="2" name="Title 1"/>
+          <p:cNvSpPr>
+            <a:spLocks noGrp="1"/>
+          </p:cNvSpPr>
+          <p:nvPr>
+            <p:ph type="title"/>
+          </p:nvPr>
+        </p:nvSpPr>
+        <p:spPr/>
+        <p:txBody>
+          <a:bodyPr/>
+          <a:lstStyle/>
+          <a:p>
+            <a:r>
+              <a:rPr lang="en-US" dirty="0"/>
+              <a:t>Subplots</a:t>
+            </a:r>
+          </a:p>
+        </p:txBody>
+      </p:sp>
+      <p:sp>
+        <p:nvSpPr>
+          <p:cNvPr id="3" name="Content Placeholder 2"/>
+          <p:cNvSpPr>
+            <a:spLocks noGrp="1"/>
+          </p:cNvSpPr>
+          <p:nvPr>
+            <p:ph idx="1"/>
+          </p:nvPr>
+        </p:nvSpPr>
+        <p:spPr/>
+        <p:txBody>
+          <a:bodyPr/>
+          <a:lstStyle/>
+          <a:p>
+            <a:r>
+              <a:rPr lang="en-US" dirty="0"/>
+              <a:t>Multiple plots on same figure</a:t>
+            </a:r>
+          </a:p>
+        </p:txBody>
+      </p:sp>
+      <p:pic>
+        <p:nvPicPr>
+          <p:cNvPr id="5" name="Picture 4">
+            <a:extLst>
+              <a:ext uri="{FF2B5EF4-FFF2-40B4-BE49-F238E27FC236}">
+                <a16:creationId xmlns:a16="http://schemas.microsoft.com/office/drawing/2014/main" id="{081D5AF5-2913-403D-A410-381ACDC77BE7}"/>
+              </a:ext>
+            </a:extLst>
+          </p:cNvPr>
+          <p:cNvPicPr>
+            <a:picLocks noChangeAspect="1"/>
+          </p:cNvPicPr>
+          <p:nvPr/>
+        </p:nvPicPr>
+        <p:blipFill>
+          <a:blip r:embed="rId3"/>
+          <a:stretch>
+            <a:fillRect/>
+          </a:stretch>
+        </p:blipFill>
+        <p:spPr>
+          <a:xfrm>
+            <a:off x="2094935" y="2788108"/>
+            <a:ext cx="4954129" cy="3353564"/>
+          </a:xfrm>
+          <a:prstGeom prst="rect">
+            <a:avLst/>
+          </a:prstGeom>
+        </p:spPr>
+      </p:pic>
+    </p:spTree>
+    <p:extLst>
+      <p:ext uri="{BB962C8B-B14F-4D97-AF65-F5344CB8AC3E}">
+        <p14:creationId xmlns:p14="http://schemas.microsoft.com/office/powerpoint/2010/main" val="3372831229"/>
+      </p:ext>
+    </p:extLst>
+  </p:cSld>
+  <p:clrMapOvr>
+    <a:masterClrMapping/>
+  </p:clrMapOvr>
+</p:sld>
+</file>
+
+<file path=ppt/slides/slide12.xml><?xml version="1.0" encoding="utf-8"?>
+<p:sld xmlns:a="http://schemas.openxmlformats.org/drawingml/2006/main" xmlns:r="http://schemas.openxmlformats.org/officeDocument/2006/relationships" xmlns:p="http://schemas.openxmlformats.org/presentationml/2006/main">
+  <p:cSld>
+    <p:bg>
+      <p:bgPr>
+        <a:blipFill dpi="0" rotWithShape="1">
+          <a:blip r:embed="rId2">
+            <a:lum/>
+          </a:blip>
+          <a:srcRect/>
+          <a:stretch>
+            <a:fillRect l="-10000" r="-10000"/>
+          </a:stretch>
+        </a:blipFill>
+        <a:effectLst/>
+      </p:bgPr>
+    </p:bg>
+    <p:spTree>
+      <p:nvGrpSpPr>
+        <p:cNvPr id="1" name=""/>
+        <p:cNvGrpSpPr/>
+        <p:nvPr/>
+      </p:nvGrpSpPr>
+      <p:grpSpPr>
+        <a:xfrm>
+          <a:off x="0" y="0"/>
+          <a:ext cx="0" cy="0"/>
+          <a:chOff x="0" y="0"/>
+          <a:chExt cx="0" cy="0"/>
+        </a:xfrm>
+      </p:grpSpPr>
+      <p:sp>
+        <p:nvSpPr>
+          <p:cNvPr id="2" name="Title 1"/>
+          <p:cNvSpPr>
+            <a:spLocks noGrp="1"/>
+          </p:cNvSpPr>
+          <p:nvPr>
+            <p:ph type="title"/>
+          </p:nvPr>
+        </p:nvSpPr>
+        <p:spPr/>
+        <p:txBody>
+          <a:bodyPr/>
+          <a:lstStyle/>
+          <a:p>
+            <a:r>
+              <a:rPr lang="en-US" dirty="0"/>
+              <a:t>Customization</a:t>
+            </a:r>
+          </a:p>
+        </p:txBody>
+      </p:sp>
+      <p:sp>
+        <p:nvSpPr>
+          <p:cNvPr id="3" name="Content Placeholder 2"/>
+          <p:cNvSpPr>
+            <a:spLocks noGrp="1"/>
+          </p:cNvSpPr>
+          <p:nvPr>
+            <p:ph idx="1"/>
+          </p:nvPr>
+        </p:nvSpPr>
+        <p:spPr/>
+        <p:txBody>
+          <a:bodyPr/>
+          <a:lstStyle/>
+          <a:p>
+            <a:r>
+              <a:rPr lang="en-US" dirty="0"/>
+              <a:t>Can add events to plots that allow things to happen if a trigger occurs</a:t>
+            </a:r>
+          </a:p>
+          <a:p>
+            <a:pPr lvl="1"/>
+            <a:r>
+              <a:rPr lang="en-US" dirty="0"/>
+              <a:t>Mouse click could change colors or scale</a:t>
+            </a:r>
+          </a:p>
+        </p:txBody>
+      </p:sp>
+    </p:spTree>
+    <p:extLst>
+      <p:ext uri="{BB962C8B-B14F-4D97-AF65-F5344CB8AC3E}">
+        <p14:creationId xmlns:p14="http://schemas.microsoft.com/office/powerpoint/2010/main" val="102948992"/>
+      </p:ext>
+    </p:extLst>
+  </p:cSld>
+  <p:clrMapOvr>
+    <a:masterClrMapping/>
+  </p:clrMapOvr>
+</p:sld>
+</file>
+
+<file path=ppt/slides/slide13.xml><?xml version="1.0" encoding="utf-8"?>
+<p:sld xmlns:a="http://schemas.openxmlformats.org/drawingml/2006/main" xmlns:r="http://schemas.openxmlformats.org/officeDocument/2006/relationships" xmlns:p="http://schemas.openxmlformats.org/presentationml/2006/main">
+  <p:cSld>
+    <p:bg>
+      <p:bgPr>
+        <a:blipFill dpi="0" rotWithShape="1">
+          <a:blip r:embed="rId2">
+            <a:lum/>
+          </a:blip>
+          <a:srcRect/>
+          <a:stretch>
+            <a:fillRect l="-10000" r="-10000"/>
+          </a:stretch>
+        </a:blipFill>
+        <a:effectLst/>
+      </p:bgPr>
+    </p:bg>
+    <p:spTree>
+      <p:nvGrpSpPr>
+        <p:cNvPr id="1" name=""/>
+        <p:cNvGrpSpPr/>
+        <p:nvPr/>
+      </p:nvGrpSpPr>
+      <p:grpSpPr>
+        <a:xfrm>
+          <a:off x="0" y="0"/>
+          <a:ext cx="0" cy="0"/>
+          <a:chOff x="0" y="0"/>
+          <a:chExt cx="0" cy="0"/>
+        </a:xfrm>
+      </p:grpSpPr>
+      <p:sp>
+        <p:nvSpPr>
+          <p:cNvPr id="2" name="Title 1"/>
+          <p:cNvSpPr>
+            <a:spLocks noGrp="1"/>
+          </p:cNvSpPr>
+          <p:nvPr>
+            <p:ph type="title"/>
+          </p:nvPr>
+        </p:nvSpPr>
+        <p:spPr/>
+        <p:txBody>
+          <a:bodyPr/>
+          <a:lstStyle/>
+          <a:p>
+            <a:r>
+              <a:rPr lang="en-US" dirty="0"/>
+              <a:t>Free Data Sets</a:t>
+            </a:r>
+          </a:p>
+        </p:txBody>
+      </p:sp>
+      <p:sp>
+        <p:nvSpPr>
+          <p:cNvPr id="3" name="Content Placeholder 2"/>
+          <p:cNvSpPr>
+            <a:spLocks noGrp="1"/>
+          </p:cNvSpPr>
+          <p:nvPr>
+            <p:ph idx="1"/>
+          </p:nvPr>
+        </p:nvSpPr>
+        <p:spPr/>
+        <p:txBody>
+          <a:bodyPr/>
+          <a:lstStyle/>
+          <a:p>
+            <a:r>
+              <a:rPr lang="en-US" dirty="0"/>
+              <a:t>https://data.oecd.org/price/inflation-cpi.htm</a:t>
+            </a:r>
+          </a:p>
+          <a:p>
+            <a:endParaRPr lang="en-US" dirty="0"/>
+          </a:p>
+        </p:txBody>
+      </p:sp>
+    </p:spTree>
+    <p:extLst>
+      <p:ext uri="{BB962C8B-B14F-4D97-AF65-F5344CB8AC3E}">
+        <p14:creationId xmlns:p14="http://schemas.microsoft.com/office/powerpoint/2010/main" val="1586468535"/>
+      </p:ext>
+    </p:extLst>
+  </p:cSld>
+  <p:clrMapOvr>
+    <a:masterClrMapping/>
+  </p:clrMapOvr>
+</p:sld>
+</file>
+
+<file path=ppt/slides/slide14.xml><?xml version="1.0" encoding="utf-8"?>
+<p:sld xmlns:a="http://schemas.openxmlformats.org/drawingml/2006/main" xmlns:r="http://schemas.openxmlformats.org/officeDocument/2006/relationships" xmlns:p="http://schemas.openxmlformats.org/presentationml/2006/main">
+  <p:cSld>
+    <p:bg>
+      <p:bgPr>
+        <a:blipFill dpi="0" rotWithShape="1">
+          <a:blip r:embed="rId2">
+            <a:lum/>
+          </a:blip>
+          <a:srcRect/>
+          <a:stretch>
+            <a:fillRect l="-10000" r="-10000"/>
+          </a:stretch>
+        </a:blipFill>
+        <a:effectLst/>
+      </p:bgPr>
+    </p:bg>
+    <p:spTree>
+      <p:nvGrpSpPr>
+        <p:cNvPr id="1" name=""/>
+        <p:cNvGrpSpPr/>
+        <p:nvPr/>
+      </p:nvGrpSpPr>
+      <p:grpSpPr>
+        <a:xfrm>
+          <a:off x="0" y="0"/>
+          <a:ext cx="0" cy="0"/>
+          <a:chOff x="0" y="0"/>
+          <a:chExt cx="0" cy="0"/>
+        </a:xfrm>
+      </p:grpSpPr>
+      <p:sp>
+        <p:nvSpPr>
+          <p:cNvPr id="2" name="Title 1"/>
+          <p:cNvSpPr>
+            <a:spLocks noGrp="1"/>
+          </p:cNvSpPr>
+          <p:nvPr>
+            <p:ph type="title"/>
+          </p:nvPr>
+        </p:nvSpPr>
+        <p:spPr/>
+        <p:txBody>
+          <a:bodyPr/>
+          <a:lstStyle/>
+          <a:p>
+            <a:r>
+              <a:rPr lang="en-US" dirty="0"/>
+              <a:t>LICENSE</a:t>
+            </a:r>
+          </a:p>
+        </p:txBody>
+      </p:sp>
+      <p:sp>
+        <p:nvSpPr>
+          <p:cNvPr id="3" name="Content Placeholder 2"/>
+          <p:cNvSpPr>
+            <a:spLocks noGrp="1"/>
+          </p:cNvSpPr>
+          <p:nvPr>
+            <p:ph idx="1"/>
+          </p:nvPr>
+        </p:nvSpPr>
+        <p:spPr/>
+        <p:txBody>
+          <a:bodyPr>
+            <a:normAutofit fontScale="62500" lnSpcReduction="20000"/>
+          </a:bodyPr>
+          <a:lstStyle/>
+          <a:p>
+            <a:r>
+              <a:rPr lang="en-US" dirty="0"/>
+              <a:t>Copyright 2018 Douglas Bowman</a:t>
+            </a:r>
+          </a:p>
+          <a:p>
+            <a:r>
+              <a:rPr lang="en-US" dirty="0"/>
+              <a:t>Permission is hereby granted, free of charge, to any person obtaining a copy of this software and associated documentation files (the "Software"), to deal in the Software without restriction, including without limitation the rights to use, copy, modify, merge, publish, distribute, sublicense, and/or sell copies of the Software, and to permit persons to whom the Software is furnished to do so, subject to the following conditions:</a:t>
+            </a:r>
+          </a:p>
+          <a:p>
+            <a:r>
+              <a:rPr lang="en-US" dirty="0"/>
+              <a:t>The above copyright notice and this permission notice shall be included in all copies or substantial portions of the Software.</a:t>
+            </a:r>
+          </a:p>
+          <a:p>
+            <a:r>
+              <a:rPr lang="en-US" dirty="0"/>
+              <a:t>THE SOFTWARE IS PROVIDED "AS IS", WITHOUT WARRANTY OF ANY KIND, EXPRESS OR IMPLIED, INCLUDING BUT NOT LIMITED TO THE WARRANTIES OF MERCHANTABILITY, FITNESS FOR A PARTICULAR PURPOSE AND NONINFRINGEMENT. IN NO EVENT SHALL THE AUTHORS OR COPYRIGHT HOLDERS BE LIABLE FOR ANY CLAIM, DAMAGES OR OTHER LIABILITY, WHETHER IN AN ACTION OF CONTRACT, TORT OR OTHERWISE, ARISING FROM, OUT OF OR IN CONNECTION WITH THE SOFTWARE OR THE USE OR OTHER DEALINGS IN THE SOFTWARE.</a:t>
+            </a:r>
+          </a:p>
+        </p:txBody>
+      </p:sp>
+    </p:spTree>
+    <p:extLst>
+      <p:ext uri="{BB962C8B-B14F-4D97-AF65-F5344CB8AC3E}">
+        <p14:creationId xmlns:p14="http://schemas.microsoft.com/office/powerpoint/2010/main" val="3645036191"/>
+      </p:ext>
+    </p:extLst>
+  </p:cSld>
+  <p:clrMapOvr>
+    <a:masterClrMapping/>
+  </p:clrMapOvr>
+</p:sld>
+</file>
+
 <file path=ppt/slides/slide2.xml><?xml version="1.0" encoding="utf-8"?>
 <p:sld xmlns:a="http://schemas.openxmlformats.org/drawingml/2006/main" xmlns:r="http://schemas.openxmlformats.org/officeDocument/2006/relationships" xmlns:p="http://schemas.openxmlformats.org/presentationml/2006/main">
   <p:cSld>
@@ -6860,7 +7401,7 @@
         <p:spPr/>
         <p:txBody>
           <a:bodyPr>
-            <a:normAutofit lnSpcReduction="10000"/>
+            <a:normAutofit/>
           </a:bodyPr>
           <a:lstStyle/>
           <a:p>
@@ -6870,54 +7411,40 @@
             </a:r>
           </a:p>
           <a:p>
-            <a:r>
-              <a:rPr lang="en-US" dirty="0"/>
-              <a:t>Pie Chart</a:t>
-            </a:r>
-          </a:p>
-          <a:p>
-            <a:r>
-              <a:rPr lang="en-US" dirty="0"/>
-              <a:t>Bar Graph</a:t>
-            </a:r>
-          </a:p>
-          <a:p>
-            <a:pPr lvl="1"/>
-            <a:r>
-              <a:rPr lang="en-US" dirty="0"/>
-              <a:t>Vertical</a:t>
-            </a:r>
-          </a:p>
-          <a:p>
-            <a:pPr lvl="1"/>
-            <a:r>
-              <a:rPr lang="en-US" dirty="0"/>
-              <a:t>Horizontal</a:t>
-            </a:r>
-          </a:p>
-          <a:p>
-            <a:r>
-              <a:rPr lang="en-US" dirty="0"/>
-              <a:t>Histogram</a:t>
-            </a:r>
-          </a:p>
-          <a:p>
-            <a:r>
-              <a:rPr lang="en-US" dirty="0"/>
-              <a:t>3D</a:t>
-            </a:r>
-          </a:p>
-          <a:p>
-            <a:r>
-              <a:rPr lang="en-US" dirty="0"/>
-              <a:t>Polar</a:t>
-            </a:r>
-          </a:p>
-          <a:p>
             <a:endParaRPr lang="en-US" dirty="0"/>
           </a:p>
         </p:txBody>
       </p:sp>
+      <p:pic>
+        <p:nvPicPr>
+          <p:cNvPr id="5" name="Picture 4">
+            <a:extLst>
+              <a:ext uri="{FF2B5EF4-FFF2-40B4-BE49-F238E27FC236}">
+                <a16:creationId xmlns:a16="http://schemas.microsoft.com/office/drawing/2014/main" id="{8C331CF5-7686-4B5C-B20C-6E3826F9F254}"/>
+              </a:ext>
+            </a:extLst>
+          </p:cNvPr>
+          <p:cNvPicPr>
+            <a:picLocks noChangeAspect="1"/>
+          </p:cNvPicPr>
+          <p:nvPr/>
+        </p:nvPicPr>
+        <p:blipFill>
+          <a:blip r:embed="rId3"/>
+          <a:stretch>
+            <a:fillRect/>
+          </a:stretch>
+        </p:blipFill>
+        <p:spPr>
+          <a:xfrm>
+            <a:off x="2063178" y="2743200"/>
+            <a:ext cx="5017643" cy="3531405"/>
+          </a:xfrm>
+          <a:prstGeom prst="rect">
+            <a:avLst/>
+          </a:prstGeom>
+        </p:spPr>
+      </p:pic>
     </p:spTree>
     <p:extLst>
       <p:ext uri="{BB962C8B-B14F-4D97-AF65-F5344CB8AC3E}">
@@ -6979,7 +7506,7 @@
           <a:p>
             <a:r>
               <a:rPr lang="en-US" dirty="0"/>
-              <a:t>Subplots</a:t>
+              <a:t>Sample Plot Types</a:t>
             </a:r>
           </a:p>
         </p:txBody>
@@ -6996,20 +7523,55 @@
         </p:nvSpPr>
         <p:spPr/>
         <p:txBody>
-          <a:bodyPr/>
+          <a:bodyPr>
+            <a:normAutofit/>
+          </a:bodyPr>
           <a:lstStyle/>
           <a:p>
             <a:r>
               <a:rPr lang="en-US" dirty="0"/>
-              <a:t>Multiple plots on same figure</a:t>
-            </a:r>
-          </a:p>
-        </p:txBody>
-      </p:sp>
+              <a:t>Pie Chart</a:t>
+            </a:r>
+          </a:p>
+          <a:p>
+            <a:endParaRPr lang="en-US" dirty="0"/>
+          </a:p>
+        </p:txBody>
+      </p:sp>
+      <p:pic>
+        <p:nvPicPr>
+          <p:cNvPr id="5" name="Picture 4">
+            <a:extLst>
+              <a:ext uri="{FF2B5EF4-FFF2-40B4-BE49-F238E27FC236}">
+                <a16:creationId xmlns:a16="http://schemas.microsoft.com/office/drawing/2014/main" id="{7E081FD5-2968-44AF-876F-E006918BF13B}"/>
+              </a:ext>
+            </a:extLst>
+          </p:cNvPr>
+          <p:cNvPicPr>
+            <a:picLocks noChangeAspect="1"/>
+          </p:cNvPicPr>
+          <p:nvPr/>
+        </p:nvPicPr>
+        <p:blipFill>
+          <a:blip r:embed="rId3"/>
+          <a:stretch>
+            <a:fillRect/>
+          </a:stretch>
+        </p:blipFill>
+        <p:spPr>
+          <a:xfrm>
+            <a:off x="3104815" y="2743200"/>
+            <a:ext cx="2934369" cy="3163021"/>
+          </a:xfrm>
+          <a:prstGeom prst="rect">
+            <a:avLst/>
+          </a:prstGeom>
+        </p:spPr>
+      </p:pic>
     </p:spTree>
     <p:extLst>
       <p:ext uri="{BB962C8B-B14F-4D97-AF65-F5344CB8AC3E}">
-        <p14:creationId xmlns:p14="http://schemas.microsoft.com/office/powerpoint/2010/main" val="3372831229"/>
+        <p14:creationId xmlns:p14="http://schemas.microsoft.com/office/powerpoint/2010/main" val="857911766"/>
       </p:ext>
     </p:extLst>
   </p:cSld>
@@ -7067,7 +7629,7 @@
           <a:p>
             <a:r>
               <a:rPr lang="en-US" dirty="0"/>
-              <a:t>Customization</a:t>
+              <a:t>Sample Plot Types</a:t>
             </a:r>
           </a:p>
         </p:txBody>
@@ -7084,27 +7646,59 @@
         </p:nvSpPr>
         <p:spPr/>
         <p:txBody>
-          <a:bodyPr/>
+          <a:bodyPr>
+            <a:normAutofit/>
+          </a:bodyPr>
           <a:lstStyle/>
           <a:p>
             <a:r>
               <a:rPr lang="en-US" dirty="0"/>
-              <a:t>Can add events to plots that allow things to happen if a trigger occurs</a:t>
+              <a:t>Bar Graph</a:t>
             </a:r>
           </a:p>
           <a:p>
             <a:pPr lvl="1"/>
             <a:r>
               <a:rPr lang="en-US" dirty="0"/>
-              <a:t>Mouse click could change colors or scale</a:t>
-            </a:r>
-          </a:p>
-        </p:txBody>
-      </p:sp>
+              <a:t>Vertical</a:t>
+            </a:r>
+          </a:p>
+        </p:txBody>
+      </p:sp>
+      <p:pic>
+        <p:nvPicPr>
+          <p:cNvPr id="5" name="Picture 4">
+            <a:extLst>
+              <a:ext uri="{FF2B5EF4-FFF2-40B4-BE49-F238E27FC236}">
+                <a16:creationId xmlns:a16="http://schemas.microsoft.com/office/drawing/2014/main" id="{D0C3F748-5533-4672-834D-BD630478AEE9}"/>
+              </a:ext>
+            </a:extLst>
+          </p:cNvPr>
+          <p:cNvPicPr>
+            <a:picLocks noChangeAspect="1"/>
+          </p:cNvPicPr>
+          <p:nvPr/>
+        </p:nvPicPr>
+        <p:blipFill>
+          <a:blip r:embed="rId3"/>
+          <a:stretch>
+            <a:fillRect/>
+          </a:stretch>
+        </p:blipFill>
+        <p:spPr>
+          <a:xfrm>
+            <a:off x="3352800" y="2455027"/>
+            <a:ext cx="5017643" cy="3671136"/>
+          </a:xfrm>
+          <a:prstGeom prst="rect">
+            <a:avLst/>
+          </a:prstGeom>
+        </p:spPr>
+      </p:pic>
     </p:spTree>
     <p:extLst>
       <p:ext uri="{BB962C8B-B14F-4D97-AF65-F5344CB8AC3E}">
-        <p14:creationId xmlns:p14="http://schemas.microsoft.com/office/powerpoint/2010/main" val="102948992"/>
+        <p14:creationId xmlns:p14="http://schemas.microsoft.com/office/powerpoint/2010/main" val="2975000609"/>
       </p:ext>
     </p:extLst>
   </p:cSld>
@@ -7162,7 +7756,7 @@
           <a:p>
             <a:r>
               <a:rPr lang="en-US" dirty="0"/>
-              <a:t>Free Data Sets</a:t>
+              <a:t>Sample Plot Types</a:t>
             </a:r>
           </a:p>
         </p:txBody>
@@ -7179,12 +7773,21 @@
         </p:nvSpPr>
         <p:spPr/>
         <p:txBody>
-          <a:bodyPr/>
+          <a:bodyPr>
+            <a:normAutofit/>
+          </a:bodyPr>
           <a:lstStyle/>
           <a:p>
             <a:r>
               <a:rPr lang="en-US" dirty="0"/>
-              <a:t>https://data.oecd.org/price/inflation-cpi.htm</a:t>
+              <a:t>Bar Graph</a:t>
+            </a:r>
+          </a:p>
+          <a:p>
+            <a:pPr lvl="1"/>
+            <a:r>
+              <a:rPr lang="en-US" dirty="0"/>
+              <a:t>Horizontal</a:t>
             </a:r>
           </a:p>
           <a:p>
@@ -7192,10 +7795,40 @@
           </a:p>
         </p:txBody>
       </p:sp>
+      <p:pic>
+        <p:nvPicPr>
+          <p:cNvPr id="6" name="Picture 5">
+            <a:extLst>
+              <a:ext uri="{FF2B5EF4-FFF2-40B4-BE49-F238E27FC236}">
+                <a16:creationId xmlns:a16="http://schemas.microsoft.com/office/drawing/2014/main" id="{71E32319-8CAB-4AFC-A648-B20B1DD7FF9D}"/>
+              </a:ext>
+            </a:extLst>
+          </p:cNvPr>
+          <p:cNvPicPr>
+            <a:picLocks noChangeAspect="1"/>
+          </p:cNvPicPr>
+          <p:nvPr/>
+        </p:nvPicPr>
+        <p:blipFill>
+          <a:blip r:embed="rId3"/>
+          <a:stretch>
+            <a:fillRect/>
+          </a:stretch>
+        </p:blipFill>
+        <p:spPr>
+          <a:xfrm>
+            <a:off x="3505200" y="2566368"/>
+            <a:ext cx="4954129" cy="3734651"/>
+          </a:xfrm>
+          <a:prstGeom prst="rect">
+            <a:avLst/>
+          </a:prstGeom>
+        </p:spPr>
+      </p:pic>
     </p:spTree>
     <p:extLst>
       <p:ext uri="{BB962C8B-B14F-4D97-AF65-F5344CB8AC3E}">
-        <p14:creationId xmlns:p14="http://schemas.microsoft.com/office/powerpoint/2010/main" val="1586468535"/>
+        <p14:creationId xmlns:p14="http://schemas.microsoft.com/office/powerpoint/2010/main" val="2143765768"/>
       </p:ext>
     </p:extLst>
   </p:cSld>
@@ -7253,7 +7886,7 @@
           <a:p>
             <a:r>
               <a:rPr lang="en-US" dirty="0"/>
-              <a:t>LICENSE</a:t>
+              <a:t>Sample Plot Types</a:t>
             </a:r>
           </a:p>
         </p:txBody>
@@ -7271,39 +7904,177 @@
         <p:spPr/>
         <p:txBody>
           <a:bodyPr>
-            <a:normAutofit fontScale="62500" lnSpcReduction="20000"/>
+            <a:normAutofit/>
           </a:bodyPr>
           <a:lstStyle/>
           <a:p>
             <a:r>
               <a:rPr lang="en-US" dirty="0"/>
-              <a:t>Copyright 2018 Douglas Bowman</a:t>
-            </a:r>
-          </a:p>
-          <a:p>
-            <a:r>
-              <a:rPr lang="en-US" dirty="0"/>
-              <a:t>Permission is hereby granted, free of charge, to any person obtaining a copy of this software and associated documentation files (the "Software"), to deal in the Software without restriction, including without limitation the rights to use, copy, modify, merge, publish, distribute, sublicense, and/or sell copies of the Software, and to permit persons to whom the Software is furnished to do so, subject to the following conditions:</a:t>
-            </a:r>
-          </a:p>
-          <a:p>
-            <a:r>
-              <a:rPr lang="en-US" dirty="0"/>
-              <a:t>The above copyright notice and this permission notice shall be included in all copies or substantial portions of the Software.</a:t>
-            </a:r>
-          </a:p>
-          <a:p>
-            <a:r>
-              <a:rPr lang="en-US" dirty="0"/>
-              <a:t>THE SOFTWARE IS PROVIDED "AS IS", WITHOUT WARRANTY OF ANY KIND, EXPRESS OR IMPLIED, INCLUDING BUT NOT LIMITED TO THE WARRANTIES OF MERCHANTABILITY, FITNESS FOR A PARTICULAR PURPOSE AND NONINFRINGEMENT. IN NO EVENT SHALL THE AUTHORS OR COPYRIGHT HOLDERS BE LIABLE FOR ANY CLAIM, DAMAGES OR OTHER LIABILITY, WHETHER IN AN ACTION OF CONTRACT, TORT OR OTHERWISE, ARISING FROM, OUT OF OR IN CONNECTION WITH THE SOFTWARE OR THE USE OR OTHER DEALINGS IN THE SOFTWARE.</a:t>
-            </a:r>
-          </a:p>
-        </p:txBody>
-      </p:sp>
+              <a:t>Histogram</a:t>
+            </a:r>
+          </a:p>
+          <a:p>
+            <a:endParaRPr lang="en-US" dirty="0"/>
+          </a:p>
+        </p:txBody>
+      </p:sp>
+      <p:pic>
+        <p:nvPicPr>
+          <p:cNvPr id="7" name="Picture 6">
+            <a:extLst>
+              <a:ext uri="{FF2B5EF4-FFF2-40B4-BE49-F238E27FC236}">
+                <a16:creationId xmlns:a16="http://schemas.microsoft.com/office/drawing/2014/main" id="{560FAF8E-423F-4AE5-B875-EEE66CEB21A9}"/>
+              </a:ext>
+            </a:extLst>
+          </p:cNvPr>
+          <p:cNvPicPr>
+            <a:picLocks noChangeAspect="1"/>
+          </p:cNvPicPr>
+          <p:nvPr/>
+        </p:nvPicPr>
+        <p:blipFill>
+          <a:blip r:embed="rId3"/>
+          <a:stretch>
+            <a:fillRect/>
+          </a:stretch>
+        </p:blipFill>
+        <p:spPr>
+          <a:xfrm>
+            <a:off x="2082233" y="2667000"/>
+            <a:ext cx="4979534" cy="3531405"/>
+          </a:xfrm>
+          <a:prstGeom prst="rect">
+            <a:avLst/>
+          </a:prstGeom>
+        </p:spPr>
+      </p:pic>
     </p:spTree>
     <p:extLst>
       <p:ext uri="{BB962C8B-B14F-4D97-AF65-F5344CB8AC3E}">
-        <p14:creationId xmlns:p14="http://schemas.microsoft.com/office/powerpoint/2010/main" val="3645036191"/>
+        <p14:creationId xmlns:p14="http://schemas.microsoft.com/office/powerpoint/2010/main" val="2657079388"/>
+      </p:ext>
+    </p:extLst>
+  </p:cSld>
+  <p:clrMapOvr>
+    <a:masterClrMapping/>
+  </p:clrMapOvr>
+</p:sld>
+</file>
+
+<file path=ppt/slides/slide9.xml><?xml version="1.0" encoding="utf-8"?>
+<p:sld xmlns:a="http://schemas.openxmlformats.org/drawingml/2006/main" xmlns:r="http://schemas.openxmlformats.org/officeDocument/2006/relationships" xmlns:p="http://schemas.openxmlformats.org/presentationml/2006/main">
+  <p:cSld>
+    <p:bg>
+      <p:bgPr>
+        <a:blipFill dpi="0" rotWithShape="1">
+          <a:blip r:embed="rId2">
+            <a:lum/>
+          </a:blip>
+          <a:srcRect/>
+          <a:stretch>
+            <a:fillRect l="-10000" r="-10000"/>
+          </a:stretch>
+        </a:blipFill>
+        <a:effectLst/>
+      </p:bgPr>
+    </p:bg>
+    <p:spTree>
+      <p:nvGrpSpPr>
+        <p:cNvPr id="1" name=""/>
+        <p:cNvGrpSpPr/>
+        <p:nvPr/>
+      </p:nvGrpSpPr>
+      <p:grpSpPr>
+        <a:xfrm>
+          <a:off x="0" y="0"/>
+          <a:ext cx="0" cy="0"/>
+          <a:chOff x="0" y="0"/>
+          <a:chExt cx="0" cy="0"/>
+        </a:xfrm>
+      </p:grpSpPr>
+      <p:sp>
+        <p:nvSpPr>
+          <p:cNvPr id="2" name="Title 1"/>
+          <p:cNvSpPr>
+            <a:spLocks noGrp="1"/>
+          </p:cNvSpPr>
+          <p:nvPr>
+            <p:ph type="title"/>
+          </p:nvPr>
+        </p:nvSpPr>
+        <p:spPr/>
+        <p:txBody>
+          <a:bodyPr/>
+          <a:lstStyle/>
+          <a:p>
+            <a:r>
+              <a:rPr lang="en-US" dirty="0"/>
+              <a:t>Sample Plot Types</a:t>
+            </a:r>
+          </a:p>
+        </p:txBody>
+      </p:sp>
+      <p:sp>
+        <p:nvSpPr>
+          <p:cNvPr id="3" name="Content Placeholder 2"/>
+          <p:cNvSpPr>
+            <a:spLocks noGrp="1"/>
+          </p:cNvSpPr>
+          <p:nvPr>
+            <p:ph idx="1"/>
+          </p:nvPr>
+        </p:nvSpPr>
+        <p:spPr/>
+        <p:txBody>
+          <a:bodyPr>
+            <a:normAutofit/>
+          </a:bodyPr>
+          <a:lstStyle/>
+          <a:p>
+            <a:r>
+              <a:rPr lang="en-US" dirty="0"/>
+              <a:t>3D</a:t>
+            </a:r>
+          </a:p>
+          <a:p>
+            <a:endParaRPr lang="en-US" dirty="0"/>
+          </a:p>
+        </p:txBody>
+      </p:sp>
+      <p:pic>
+        <p:nvPicPr>
+          <p:cNvPr id="5" name="Picture 4">
+            <a:extLst>
+              <a:ext uri="{FF2B5EF4-FFF2-40B4-BE49-F238E27FC236}">
+                <a16:creationId xmlns:a16="http://schemas.microsoft.com/office/drawing/2014/main" id="{AE731DFB-61E3-4BAC-985B-303577E5379C}"/>
+              </a:ext>
+            </a:extLst>
+          </p:cNvPr>
+          <p:cNvPicPr>
+            <a:picLocks noChangeAspect="1"/>
+          </p:cNvPicPr>
+          <p:nvPr/>
+        </p:nvPicPr>
+        <p:blipFill>
+          <a:blip r:embed="rId3"/>
+          <a:stretch>
+            <a:fillRect/>
+          </a:stretch>
+        </p:blipFill>
+        <p:spPr>
+          <a:xfrm>
+            <a:off x="2355345" y="2895600"/>
+            <a:ext cx="4433310" cy="2934369"/>
+          </a:xfrm>
+          <a:prstGeom prst="rect">
+            <a:avLst/>
+          </a:prstGeom>
+        </p:spPr>
+      </p:pic>
+    </p:spTree>
+    <p:extLst>
+      <p:ext uri="{BB962C8B-B14F-4D97-AF65-F5344CB8AC3E}">
+        <p14:creationId xmlns:p14="http://schemas.microsoft.com/office/powerpoint/2010/main" val="2234588563"/>
       </p:ext>
     </p:extLst>
   </p:cSld>

</xml_diff>

<commit_message>
Added reasons for selecting a certain type of plot.
</commit_message>
<xml_diff>
--- a/Session 7 - Python/Instructional Material/Session 7 - Python Plotting with MatPlotLib.pptx
+++ b/Session 7 - Python/Instructional Material/Session 7 - Python Plotting with MatPlotLib.pptx
@@ -316,7 +316,7 @@
           <a:p>
             <a:fld id="{547641E8-73DF-4AD2-848E-3103064331B1}" type="datetimeFigureOut">
               <a:rPr lang="en-US" smtClean="0"/>
-              <a:t>10/27/2021</a:t>
+              <a:t>11/3/2021</a:t>
             </a:fld>
             <a:endParaRPr lang="en-US"/>
           </a:p>
@@ -484,7 +484,7 @@
           <a:p>
             <a:fld id="{547641E8-73DF-4AD2-848E-3103064331B1}" type="datetimeFigureOut">
               <a:rPr lang="en-US" smtClean="0"/>
-              <a:t>10/27/2021</a:t>
+              <a:t>11/3/2021</a:t>
             </a:fld>
             <a:endParaRPr lang="en-US"/>
           </a:p>
@@ -662,7 +662,7 @@
           <a:p>
             <a:fld id="{547641E8-73DF-4AD2-848E-3103064331B1}" type="datetimeFigureOut">
               <a:rPr lang="en-US" smtClean="0"/>
-              <a:t>10/27/2021</a:t>
+              <a:t>11/3/2021</a:t>
             </a:fld>
             <a:endParaRPr lang="en-US"/>
           </a:p>
@@ -909,7 +909,7 @@
                 </a:solidFill>
               </a:rPr>
               <a:pPr/>
-              <a:t>10/27/2021</a:t>
+              <a:t>11/3/2021</a:t>
             </a:fld>
             <a:endParaRPr lang="en-US">
               <a:solidFill>
@@ -1109,7 +1109,7 @@
                 </a:solidFill>
               </a:rPr>
               <a:pPr/>
-              <a:t>10/27/2021</a:t>
+              <a:t>11/3/2021</a:t>
             </a:fld>
             <a:endParaRPr lang="en-US">
               <a:solidFill>
@@ -1386,7 +1386,7 @@
                 </a:solidFill>
               </a:rPr>
               <a:pPr/>
-              <a:t>10/27/2021</a:t>
+              <a:t>11/3/2021</a:t>
             </a:fld>
             <a:endParaRPr lang="en-US">
               <a:solidFill>
@@ -1703,7 +1703,7 @@
                 </a:solidFill>
               </a:rPr>
               <a:pPr/>
-              <a:t>10/27/2021</a:t>
+              <a:t>11/3/2021</a:t>
             </a:fld>
             <a:endParaRPr lang="en-US">
               <a:solidFill>
@@ -2154,7 +2154,7 @@
                 </a:solidFill>
               </a:rPr>
               <a:pPr/>
-              <a:t>10/27/2021</a:t>
+              <a:t>11/3/2021</a:t>
             </a:fld>
             <a:endParaRPr lang="en-US">
               <a:solidFill>
@@ -2303,7 +2303,7 @@
                 </a:solidFill>
               </a:rPr>
               <a:pPr/>
-              <a:t>10/27/2021</a:t>
+              <a:t>11/3/2021</a:t>
             </a:fld>
             <a:endParaRPr lang="en-US">
               <a:solidFill>
@@ -2430,7 +2430,7 @@
                 </a:solidFill>
               </a:rPr>
               <a:pPr/>
-              <a:t>10/27/2021</a:t>
+              <a:t>11/3/2021</a:t>
             </a:fld>
             <a:endParaRPr lang="en-US">
               <a:solidFill>
@@ -2737,7 +2737,7 @@
                 </a:solidFill>
               </a:rPr>
               <a:pPr/>
-              <a:t>10/27/2021</a:t>
+              <a:t>11/3/2021</a:t>
             </a:fld>
             <a:endParaRPr lang="en-US">
               <a:solidFill>
@@ -2930,7 +2930,7 @@
           <a:p>
             <a:fld id="{547641E8-73DF-4AD2-848E-3103064331B1}" type="datetimeFigureOut">
               <a:rPr lang="en-US" smtClean="0"/>
-              <a:t>10/27/2021</a:t>
+              <a:t>11/3/2021</a:t>
             </a:fld>
             <a:endParaRPr lang="en-US"/>
           </a:p>
@@ -3189,7 +3189,7 @@
                 </a:solidFill>
               </a:rPr>
               <a:pPr/>
-              <a:t>10/27/2021</a:t>
+              <a:t>11/3/2021</a:t>
             </a:fld>
             <a:endParaRPr lang="en-US">
               <a:solidFill>
@@ -3389,7 +3389,7 @@
                 </a:solidFill>
               </a:rPr>
               <a:pPr/>
-              <a:t>10/27/2021</a:t>
+              <a:t>11/3/2021</a:t>
             </a:fld>
             <a:endParaRPr lang="en-US">
               <a:solidFill>
@@ -3599,7 +3599,7 @@
                 </a:solidFill>
               </a:rPr>
               <a:pPr/>
-              <a:t>10/27/2021</a:t>
+              <a:t>11/3/2021</a:t>
             </a:fld>
             <a:endParaRPr lang="en-US">
               <a:solidFill>
@@ -3869,7 +3869,7 @@
           <a:p>
             <a:fld id="{547641E8-73DF-4AD2-848E-3103064331B1}" type="datetimeFigureOut">
               <a:rPr lang="en-US" smtClean="0"/>
-              <a:t>10/27/2021</a:t>
+              <a:t>11/3/2021</a:t>
             </a:fld>
             <a:endParaRPr lang="en-US"/>
           </a:p>
@@ -4154,7 +4154,7 @@
           <a:p>
             <a:fld id="{547641E8-73DF-4AD2-848E-3103064331B1}" type="datetimeFigureOut">
               <a:rPr lang="en-US" smtClean="0"/>
-              <a:t>10/27/2021</a:t>
+              <a:t>11/3/2021</a:t>
             </a:fld>
             <a:endParaRPr lang="en-US"/>
           </a:p>
@@ -4573,7 +4573,7 @@
           <a:p>
             <a:fld id="{547641E8-73DF-4AD2-848E-3103064331B1}" type="datetimeFigureOut">
               <a:rPr lang="en-US" smtClean="0"/>
-              <a:t>10/27/2021</a:t>
+              <a:t>11/3/2021</a:t>
             </a:fld>
             <a:endParaRPr lang="en-US"/>
           </a:p>
@@ -4690,7 +4690,7 @@
           <a:p>
             <a:fld id="{547641E8-73DF-4AD2-848E-3103064331B1}" type="datetimeFigureOut">
               <a:rPr lang="en-US" smtClean="0"/>
-              <a:t>10/27/2021</a:t>
+              <a:t>11/3/2021</a:t>
             </a:fld>
             <a:endParaRPr lang="en-US"/>
           </a:p>
@@ -4785,7 +4785,7 @@
           <a:p>
             <a:fld id="{547641E8-73DF-4AD2-848E-3103064331B1}" type="datetimeFigureOut">
               <a:rPr lang="en-US" smtClean="0"/>
-              <a:t>10/27/2021</a:t>
+              <a:t>11/3/2021</a:t>
             </a:fld>
             <a:endParaRPr lang="en-US"/>
           </a:p>
@@ -5060,7 +5060,7 @@
           <a:p>
             <a:fld id="{547641E8-73DF-4AD2-848E-3103064331B1}" type="datetimeFigureOut">
               <a:rPr lang="en-US" smtClean="0"/>
-              <a:t>10/27/2021</a:t>
+              <a:t>11/3/2021</a:t>
             </a:fld>
             <a:endParaRPr lang="en-US"/>
           </a:p>
@@ -5312,7 +5312,7 @@
           <a:p>
             <a:fld id="{547641E8-73DF-4AD2-848E-3103064331B1}" type="datetimeFigureOut">
               <a:rPr lang="en-US" smtClean="0"/>
-              <a:t>10/27/2021</a:t>
+              <a:t>11/3/2021</a:t>
             </a:fld>
             <a:endParaRPr lang="en-US"/>
           </a:p>
@@ -5526,7 +5526,7 @@
           <a:p>
             <a:fld id="{547641E8-73DF-4AD2-848E-3103064331B1}" type="datetimeFigureOut">
               <a:rPr lang="en-US" smtClean="0"/>
-              <a:t>10/27/2021</a:t>
+              <a:t>11/3/2021</a:t>
             </a:fld>
             <a:endParaRPr lang="en-US"/>
           </a:p>
@@ -6041,7 +6041,7 @@
                 </a:solidFill>
               </a:rPr>
               <a:pPr/>
-              <a:t>10/27/2021</a:t>
+              <a:t>11/3/2021</a:t>
             </a:fld>
             <a:endParaRPr lang="en-US">
               <a:solidFill>
@@ -6577,7 +6577,12 @@
             <p:ph idx="1"/>
           </p:nvPr>
         </p:nvSpPr>
-        <p:spPr/>
+        <p:spPr>
+          <a:xfrm>
+            <a:off x="457200" y="1600200"/>
+            <a:ext cx="4495800" cy="4525963"/>
+          </a:xfrm>
+        </p:spPr>
         <p:txBody>
           <a:bodyPr>
             <a:normAutofit/>
@@ -6587,6 +6592,20 @@
             <a:r>
               <a:rPr lang="en-US" dirty="0"/>
               <a:t>Polar</a:t>
+            </a:r>
+          </a:p>
+          <a:p>
+            <a:pPr lvl="1"/>
+            <a:r>
+              <a:rPr lang="en-US" dirty="0"/>
+              <a:t>Things circular in nature</a:t>
+            </a:r>
+          </a:p>
+          <a:p>
+            <a:pPr lvl="1"/>
+            <a:r>
+              <a:rPr lang="en-US" dirty="0"/>
+              <a:t>Things that repeat on a set cycle</a:t>
             </a:r>
           </a:p>
           <a:p>
@@ -6616,7 +6635,7 @@
         </p:blipFill>
         <p:spPr>
           <a:xfrm>
-            <a:off x="2812649" y="2667000"/>
+            <a:off x="5105400" y="2971800"/>
             <a:ext cx="3518702" cy="3417078"/>
           </a:xfrm>
           <a:prstGeom prst="rect">
@@ -7129,8 +7148,13 @@
           <a:p>
             <a:r>
               <a:rPr lang="en-US" dirty="0"/>
-              <a:t>Basic Plotting</a:t>
-            </a:r>
+              <a:t>Basic Plotting Capabilities in </a:t>
+            </a:r>
+            <a:r>
+              <a:rPr lang="en-US" dirty="0" err="1"/>
+              <a:t>MatPlotLib</a:t>
+            </a:r>
+            <a:endParaRPr lang="en-US" dirty="0"/>
           </a:p>
           <a:p>
             <a:r>
@@ -7211,13 +7235,20 @@
         </p:nvSpPr>
         <p:spPr/>
         <p:txBody>
-          <a:bodyPr/>
+          <a:bodyPr>
+            <a:normAutofit fontScale="90000"/>
+          </a:bodyPr>
           <a:lstStyle/>
           <a:p>
             <a:r>
               <a:rPr lang="en-US" dirty="0"/>
-              <a:t>Basic Plotting</a:t>
-            </a:r>
+              <a:t>Basic Plotting Capabilities in </a:t>
+            </a:r>
+            <a:r>
+              <a:rPr lang="en-US" dirty="0" err="1"/>
+              <a:t>MatPlotLib</a:t>
+            </a:r>
+            <a:endParaRPr lang="en-US" dirty="0"/>
           </a:p>
         </p:txBody>
       </p:sp>
@@ -7282,12 +7313,8 @@
           <a:p>
             <a:pPr lvl="1"/>
             <a:r>
-              <a:rPr lang="en-US"/>
-              <a:t>Linewidth </a:t>
-            </a:r>
-            <a:r>
               <a:rPr lang="en-US" dirty="0"/>
-              <a:t>keyword</a:t>
+              <a:t>Linewidth keyword</a:t>
             </a:r>
           </a:p>
           <a:p>
@@ -7411,6 +7438,13 @@
             </a:r>
           </a:p>
           <a:p>
+            <a:pPr lvl="1"/>
+            <a:r>
+              <a:rPr lang="en-US" dirty="0"/>
+              <a:t>Showing trends and patterns in data points</a:t>
+            </a:r>
+          </a:p>
+          <a:p>
             <a:endParaRPr lang="en-US" dirty="0"/>
           </a:p>
         </p:txBody>
@@ -7437,7 +7471,7 @@
         </p:blipFill>
         <p:spPr>
           <a:xfrm>
-            <a:off x="2063178" y="2743200"/>
+            <a:off x="3733800" y="2971800"/>
             <a:ext cx="5017643" cy="3531405"/>
           </a:xfrm>
           <a:prstGeom prst="rect">
@@ -7521,7 +7555,12 @@
             <p:ph idx="1"/>
           </p:nvPr>
         </p:nvSpPr>
-        <p:spPr/>
+        <p:spPr>
+          <a:xfrm>
+            <a:off x="457200" y="1600200"/>
+            <a:ext cx="5181600" cy="4525963"/>
+          </a:xfrm>
+        </p:spPr>
         <p:txBody>
           <a:bodyPr>
             <a:normAutofit/>
@@ -7531,6 +7570,20 @@
             <a:r>
               <a:rPr lang="en-US" dirty="0"/>
               <a:t>Pie Chart</a:t>
+            </a:r>
+          </a:p>
+          <a:p>
+            <a:pPr lvl="1"/>
+            <a:r>
+              <a:rPr lang="en-US" dirty="0"/>
+              <a:t>Comparing relative amounts of a whole.</a:t>
+            </a:r>
+          </a:p>
+          <a:p>
+            <a:pPr lvl="1"/>
+            <a:r>
+              <a:rPr lang="en-US" dirty="0"/>
+              <a:t>More easily shows relative sizes from 100%.</a:t>
             </a:r>
           </a:p>
           <a:p>
@@ -7560,7 +7613,7 @@
         </p:blipFill>
         <p:spPr>
           <a:xfrm>
-            <a:off x="3104815" y="2743200"/>
+            <a:off x="5752431" y="3276600"/>
             <a:ext cx="2934369" cy="3163021"/>
           </a:xfrm>
           <a:prstGeom prst="rect">
@@ -7644,7 +7697,12 @@
             <p:ph idx="1"/>
           </p:nvPr>
         </p:nvSpPr>
-        <p:spPr/>
+        <p:spPr>
+          <a:xfrm>
+            <a:off x="457200" y="1600200"/>
+            <a:ext cx="3276600" cy="4525963"/>
+          </a:xfrm>
+        </p:spPr>
         <p:txBody>
           <a:bodyPr>
             <a:normAutofit/>
@@ -7661,6 +7719,13 @@
             <a:r>
               <a:rPr lang="en-US" dirty="0"/>
               <a:t>Vertical</a:t>
+            </a:r>
+          </a:p>
+          <a:p>
+            <a:pPr lvl="1"/>
+            <a:r>
+              <a:rPr lang="en-US" dirty="0"/>
+              <a:t>Comparing items</a:t>
             </a:r>
           </a:p>
         </p:txBody>
@@ -7687,7 +7752,7 @@
         </p:blipFill>
         <p:spPr>
           <a:xfrm>
-            <a:off x="3352800" y="2455027"/>
+            <a:off x="3810000" y="2895600"/>
             <a:ext cx="5017643" cy="3671136"/>
           </a:xfrm>
           <a:prstGeom prst="rect">
@@ -7771,7 +7836,12 @@
             <p:ph idx="1"/>
           </p:nvPr>
         </p:nvSpPr>
-        <p:spPr/>
+        <p:spPr>
+          <a:xfrm>
+            <a:off x="457200" y="1600200"/>
+            <a:ext cx="3429000" cy="4525963"/>
+          </a:xfrm>
+        </p:spPr>
         <p:txBody>
           <a:bodyPr>
             <a:normAutofit/>
@@ -7788,6 +7858,27 @@
             <a:r>
               <a:rPr lang="en-US" dirty="0"/>
               <a:t>Horizontal</a:t>
+            </a:r>
+          </a:p>
+          <a:p>
+            <a:pPr lvl="1"/>
+            <a:r>
+              <a:rPr lang="en-US" dirty="0"/>
+              <a:t>Comparing items where horizontal is more natural</a:t>
+            </a:r>
+          </a:p>
+          <a:p>
+            <a:pPr lvl="2"/>
+            <a:r>
+              <a:rPr lang="en-US" dirty="0"/>
+              <a:t>Flashlight length</a:t>
+            </a:r>
+          </a:p>
+          <a:p>
+            <a:pPr lvl="2"/>
+            <a:r>
+              <a:rPr lang="en-US" dirty="0"/>
+              <a:t>Distance travelled in a race</a:t>
             </a:r>
           </a:p>
           <a:p>
@@ -7817,7 +7908,7 @@
         </p:blipFill>
         <p:spPr>
           <a:xfrm>
-            <a:off x="3505200" y="2566368"/>
+            <a:off x="3962400" y="2971800"/>
             <a:ext cx="4954129" cy="3734651"/>
           </a:xfrm>
           <a:prstGeom prst="rect">
@@ -7914,6 +8005,13 @@
             </a:r>
           </a:p>
           <a:p>
+            <a:pPr lvl="1"/>
+            <a:r>
+              <a:rPr lang="en-US" dirty="0"/>
+              <a:t>Plotting relative frequency of occurrences</a:t>
+            </a:r>
+          </a:p>
+          <a:p>
             <a:endParaRPr lang="en-US" dirty="0"/>
           </a:p>
         </p:txBody>
@@ -7940,7 +8038,7 @@
         </p:blipFill>
         <p:spPr>
           <a:xfrm>
-            <a:off x="2082233" y="2667000"/>
+            <a:off x="3962400" y="3124200"/>
             <a:ext cx="4979534" cy="3531405"/>
           </a:xfrm>
           <a:prstGeom prst="rect">
@@ -8037,6 +8135,13 @@
             </a:r>
           </a:p>
           <a:p>
+            <a:pPr lvl="1"/>
+            <a:r>
+              <a:rPr lang="en-US" dirty="0"/>
+              <a:t>Plotting things that change based on 3 parameters</a:t>
+            </a:r>
+          </a:p>
+          <a:p>
             <a:endParaRPr lang="en-US" dirty="0"/>
           </a:p>
         </p:txBody>
@@ -8063,7 +8168,7 @@
         </p:blipFill>
         <p:spPr>
           <a:xfrm>
-            <a:off x="2355345" y="2895600"/>
+            <a:off x="4419600" y="3648993"/>
             <a:ext cx="4433310" cy="2934369"/>
           </a:xfrm>
           <a:prstGeom prst="rect">

</xml_diff>

<commit_message>
Added more data source links.
</commit_message>
<xml_diff>
--- a/Session 7 - Python/Instructional Material/Session 7 - Python Plotting with MatPlotLib.pptx
+++ b/Session 7 - Python/Instructional Material/Session 7 - Python Plotting with MatPlotLib.pptx
@@ -316,7 +316,7 @@
           <a:p>
             <a:fld id="{547641E8-73DF-4AD2-848E-3103064331B1}" type="datetimeFigureOut">
               <a:rPr lang="en-US" smtClean="0"/>
-              <a:t>11/3/2021</a:t>
+              <a:t>11/16/2021</a:t>
             </a:fld>
             <a:endParaRPr lang="en-US"/>
           </a:p>
@@ -484,7 +484,7 @@
           <a:p>
             <a:fld id="{547641E8-73DF-4AD2-848E-3103064331B1}" type="datetimeFigureOut">
               <a:rPr lang="en-US" smtClean="0"/>
-              <a:t>11/3/2021</a:t>
+              <a:t>11/16/2021</a:t>
             </a:fld>
             <a:endParaRPr lang="en-US"/>
           </a:p>
@@ -662,7 +662,7 @@
           <a:p>
             <a:fld id="{547641E8-73DF-4AD2-848E-3103064331B1}" type="datetimeFigureOut">
               <a:rPr lang="en-US" smtClean="0"/>
-              <a:t>11/3/2021</a:t>
+              <a:t>11/16/2021</a:t>
             </a:fld>
             <a:endParaRPr lang="en-US"/>
           </a:p>
@@ -909,7 +909,7 @@
                 </a:solidFill>
               </a:rPr>
               <a:pPr/>
-              <a:t>11/3/2021</a:t>
+              <a:t>11/16/2021</a:t>
             </a:fld>
             <a:endParaRPr lang="en-US">
               <a:solidFill>
@@ -1109,7 +1109,7 @@
                 </a:solidFill>
               </a:rPr>
               <a:pPr/>
-              <a:t>11/3/2021</a:t>
+              <a:t>11/16/2021</a:t>
             </a:fld>
             <a:endParaRPr lang="en-US">
               <a:solidFill>
@@ -1386,7 +1386,7 @@
                 </a:solidFill>
               </a:rPr>
               <a:pPr/>
-              <a:t>11/3/2021</a:t>
+              <a:t>11/16/2021</a:t>
             </a:fld>
             <a:endParaRPr lang="en-US">
               <a:solidFill>
@@ -1703,7 +1703,7 @@
                 </a:solidFill>
               </a:rPr>
               <a:pPr/>
-              <a:t>11/3/2021</a:t>
+              <a:t>11/16/2021</a:t>
             </a:fld>
             <a:endParaRPr lang="en-US">
               <a:solidFill>
@@ -2154,7 +2154,7 @@
                 </a:solidFill>
               </a:rPr>
               <a:pPr/>
-              <a:t>11/3/2021</a:t>
+              <a:t>11/16/2021</a:t>
             </a:fld>
             <a:endParaRPr lang="en-US">
               <a:solidFill>
@@ -2303,7 +2303,7 @@
                 </a:solidFill>
               </a:rPr>
               <a:pPr/>
-              <a:t>11/3/2021</a:t>
+              <a:t>11/16/2021</a:t>
             </a:fld>
             <a:endParaRPr lang="en-US">
               <a:solidFill>
@@ -2430,7 +2430,7 @@
                 </a:solidFill>
               </a:rPr>
               <a:pPr/>
-              <a:t>11/3/2021</a:t>
+              <a:t>11/16/2021</a:t>
             </a:fld>
             <a:endParaRPr lang="en-US">
               <a:solidFill>
@@ -2737,7 +2737,7 @@
                 </a:solidFill>
               </a:rPr>
               <a:pPr/>
-              <a:t>11/3/2021</a:t>
+              <a:t>11/16/2021</a:t>
             </a:fld>
             <a:endParaRPr lang="en-US">
               <a:solidFill>
@@ -2930,7 +2930,7 @@
           <a:p>
             <a:fld id="{547641E8-73DF-4AD2-848E-3103064331B1}" type="datetimeFigureOut">
               <a:rPr lang="en-US" smtClean="0"/>
-              <a:t>11/3/2021</a:t>
+              <a:t>11/16/2021</a:t>
             </a:fld>
             <a:endParaRPr lang="en-US"/>
           </a:p>
@@ -3189,7 +3189,7 @@
                 </a:solidFill>
               </a:rPr>
               <a:pPr/>
-              <a:t>11/3/2021</a:t>
+              <a:t>11/16/2021</a:t>
             </a:fld>
             <a:endParaRPr lang="en-US">
               <a:solidFill>
@@ -3389,7 +3389,7 @@
                 </a:solidFill>
               </a:rPr>
               <a:pPr/>
-              <a:t>11/3/2021</a:t>
+              <a:t>11/16/2021</a:t>
             </a:fld>
             <a:endParaRPr lang="en-US">
               <a:solidFill>
@@ -3599,7 +3599,7 @@
                 </a:solidFill>
               </a:rPr>
               <a:pPr/>
-              <a:t>11/3/2021</a:t>
+              <a:t>11/16/2021</a:t>
             </a:fld>
             <a:endParaRPr lang="en-US">
               <a:solidFill>
@@ -3869,7 +3869,7 @@
           <a:p>
             <a:fld id="{547641E8-73DF-4AD2-848E-3103064331B1}" type="datetimeFigureOut">
               <a:rPr lang="en-US" smtClean="0"/>
-              <a:t>11/3/2021</a:t>
+              <a:t>11/16/2021</a:t>
             </a:fld>
             <a:endParaRPr lang="en-US"/>
           </a:p>
@@ -4154,7 +4154,7 @@
           <a:p>
             <a:fld id="{547641E8-73DF-4AD2-848E-3103064331B1}" type="datetimeFigureOut">
               <a:rPr lang="en-US" smtClean="0"/>
-              <a:t>11/3/2021</a:t>
+              <a:t>11/16/2021</a:t>
             </a:fld>
             <a:endParaRPr lang="en-US"/>
           </a:p>
@@ -4573,7 +4573,7 @@
           <a:p>
             <a:fld id="{547641E8-73DF-4AD2-848E-3103064331B1}" type="datetimeFigureOut">
               <a:rPr lang="en-US" smtClean="0"/>
-              <a:t>11/3/2021</a:t>
+              <a:t>11/16/2021</a:t>
             </a:fld>
             <a:endParaRPr lang="en-US"/>
           </a:p>
@@ -4690,7 +4690,7 @@
           <a:p>
             <a:fld id="{547641E8-73DF-4AD2-848E-3103064331B1}" type="datetimeFigureOut">
               <a:rPr lang="en-US" smtClean="0"/>
-              <a:t>11/3/2021</a:t>
+              <a:t>11/16/2021</a:t>
             </a:fld>
             <a:endParaRPr lang="en-US"/>
           </a:p>
@@ -4785,7 +4785,7 @@
           <a:p>
             <a:fld id="{547641E8-73DF-4AD2-848E-3103064331B1}" type="datetimeFigureOut">
               <a:rPr lang="en-US" smtClean="0"/>
-              <a:t>11/3/2021</a:t>
+              <a:t>11/16/2021</a:t>
             </a:fld>
             <a:endParaRPr lang="en-US"/>
           </a:p>
@@ -5060,7 +5060,7 @@
           <a:p>
             <a:fld id="{547641E8-73DF-4AD2-848E-3103064331B1}" type="datetimeFigureOut">
               <a:rPr lang="en-US" smtClean="0"/>
-              <a:t>11/3/2021</a:t>
+              <a:t>11/16/2021</a:t>
             </a:fld>
             <a:endParaRPr lang="en-US"/>
           </a:p>
@@ -5312,7 +5312,7 @@
           <a:p>
             <a:fld id="{547641E8-73DF-4AD2-848E-3103064331B1}" type="datetimeFigureOut">
               <a:rPr lang="en-US" smtClean="0"/>
-              <a:t>11/3/2021</a:t>
+              <a:t>11/16/2021</a:t>
             </a:fld>
             <a:endParaRPr lang="en-US"/>
           </a:p>
@@ -5526,7 +5526,7 @@
           <a:p>
             <a:fld id="{547641E8-73DF-4AD2-848E-3103064331B1}" type="datetimeFigureOut">
               <a:rPr lang="en-US" smtClean="0"/>
-              <a:t>11/3/2021</a:t>
+              <a:t>11/16/2021</a:t>
             </a:fld>
             <a:endParaRPr lang="en-US"/>
           </a:p>
@@ -6041,7 +6041,7 @@
                 </a:solidFill>
               </a:rPr>
               <a:pPr/>
-              <a:t>11/3/2021</a:t>
+              <a:t>11/16/2021</a:t>
             </a:fld>
             <a:endParaRPr lang="en-US">
               <a:solidFill>
@@ -6938,9 +6938,42 @@
           <a:lstStyle/>
           <a:p>
             <a:r>
-              <a:rPr lang="en-US" dirty="0"/>
+              <a:rPr lang="en-US" dirty="0">
+                <a:hlinkClick r:id="rId3"/>
+              </a:rPr>
               <a:t>https://data.oecd.org/price/inflation-cpi.htm</a:t>
             </a:r>
+            <a:endParaRPr lang="en-US" dirty="0"/>
+          </a:p>
+          <a:p>
+            <a:r>
+              <a:rPr lang="en-US" dirty="0">
+                <a:hlinkClick r:id="rId4"/>
+              </a:rPr>
+              <a:t>https://catalog.data.gov/</a:t>
+            </a:r>
+            <a:endParaRPr lang="en-US" dirty="0"/>
+          </a:p>
+          <a:p>
+            <a:r>
+              <a:rPr lang="en-US" dirty="0">
+                <a:hlinkClick r:id="rId5"/>
+              </a:rPr>
+              <a:t>https://web.archive.org/web/20060112045100/http://www.oxfordjournals.org/nar/database/c</a:t>
+            </a:r>
+            <a:endParaRPr lang="en-US" dirty="0"/>
+          </a:p>
+          <a:p>
+            <a:r>
+              <a:rPr lang="en-US">
+                <a:hlinkClick r:id="rId6"/>
+              </a:rPr>
+              <a:t>https://github.com/awesomedata/awesome-public-datasets</a:t>
+            </a:r>
+            <a:endParaRPr lang="en-US"/>
+          </a:p>
+          <a:p>
+            <a:endParaRPr lang="en-US" dirty="0"/>
           </a:p>
           <a:p>
             <a:endParaRPr lang="en-US" dirty="0"/>

</xml_diff>